<commit_message>
pp conclusion summary slided added
</commit_message>
<xml_diff>
--- a/future/nhs-timeline.pptx
+++ b/future/nhs-timeline.pptx
@@ -3,13 +3,15 @@
 <p:presentation xmlns:a="http://schemas.openxmlformats.org/drawingml/2006/main" xmlns:p="http://schemas.openxmlformats.org/presentationml/2006/main" xmlns:r="http://schemas.openxmlformats.org/officeDocument/2006/relationships">
   <p:sldMasterIdLst>
     <p:sldMasterId id="2147483648" r:id="rId2"/>
+    <p:sldMasterId id="2147483661" r:id="rId3"/>
   </p:sldMasterIdLst>
   <p:sldIdLst>
-    <p:sldId id="256" r:id="rId3"/>
-    <p:sldId id="257" r:id="rId4"/>
-    <p:sldId id="258" r:id="rId5"/>
-    <p:sldId id="259" r:id="rId6"/>
-    <p:sldId id="260" r:id="rId7"/>
+    <p:sldId id="256" r:id="rId4"/>
+    <p:sldId id="257" r:id="rId5"/>
+    <p:sldId id="258" r:id="rId6"/>
+    <p:sldId id="259" r:id="rId7"/>
+    <p:sldId id="260" r:id="rId8"/>
+    <p:sldId id="261" r:id="rId9"/>
   </p:sldIdLst>
   <p:sldSz cx="9144000" cy="6858000"/>
   <p:notesSz cx="7772400" cy="10058400"/>
@@ -57,7 +59,7 @@
       </p:grpSpPr>
       <p:sp>
         <p:nvSpPr>
-          <p:cNvPr id="26" name="PlaceHolder 1"/>
+          <p:cNvPr id="23" name="PlaceHolder 1"/>
           <p:cNvSpPr>
             <a:spLocks noGrp="1"/>
           </p:cNvSpPr>
@@ -68,7 +70,7 @@
         <p:spPr>
           <a:xfrm>
             <a:off x="685800" y="2130480"/>
-            <a:ext cx="7772040" cy="1469880"/>
+            <a:ext cx="7771680" cy="1469880"/>
           </a:xfrm>
           <a:prstGeom prst="rect">
             <a:avLst/>
@@ -77,13 +79,14 @@
         <p:txBody>
           <a:bodyPr lIns="0" rIns="0" tIns="0" bIns="0" anchor="ctr"/>
           <a:p>
-            <a:endParaRPr/>
-          </a:p>
-        </p:txBody>
-      </p:sp>
-      <p:sp>
-        <p:nvSpPr>
-          <p:cNvPr id="27" name="PlaceHolder 2"/>
+            <a:pPr algn="ctr"/>
+            <a:endParaRPr/>
+          </a:p>
+        </p:txBody>
+      </p:sp>
+      <p:sp>
+        <p:nvSpPr>
+          <p:cNvPr id="24" name="PlaceHolder 2"/>
           <p:cNvSpPr>
             <a:spLocks noGrp="1"/>
           </p:cNvSpPr>
@@ -109,7 +112,7 @@
       </p:sp>
       <p:sp>
         <p:nvSpPr>
-          <p:cNvPr id="28" name="PlaceHolder 3"/>
+          <p:cNvPr id="25" name="PlaceHolder 3"/>
           <p:cNvSpPr>
             <a:spLocks noGrp="1"/>
           </p:cNvSpPr>
@@ -157,7 +160,7 @@
       </p:grpSpPr>
       <p:sp>
         <p:nvSpPr>
-          <p:cNvPr id="29" name="PlaceHolder 1"/>
+          <p:cNvPr id="26" name="PlaceHolder 1"/>
           <p:cNvSpPr>
             <a:spLocks noGrp="1"/>
           </p:cNvSpPr>
@@ -168,7 +171,7 @@
         <p:spPr>
           <a:xfrm>
             <a:off x="685800" y="2130480"/>
-            <a:ext cx="7772040" cy="1469880"/>
+            <a:ext cx="7771680" cy="1469880"/>
           </a:xfrm>
           <a:prstGeom prst="rect">
             <a:avLst/>
@@ -177,13 +180,14 @@
         <p:txBody>
           <a:bodyPr lIns="0" rIns="0" tIns="0" bIns="0" anchor="ctr"/>
           <a:p>
-            <a:endParaRPr/>
-          </a:p>
-        </p:txBody>
-      </p:sp>
-      <p:sp>
-        <p:nvSpPr>
-          <p:cNvPr id="30" name="PlaceHolder 2"/>
+            <a:pPr algn="ctr"/>
+            <a:endParaRPr/>
+          </a:p>
+        </p:txBody>
+      </p:sp>
+      <p:sp>
+        <p:nvSpPr>
+          <p:cNvPr id="27" name="PlaceHolder 2"/>
           <p:cNvSpPr>
             <a:spLocks noGrp="1"/>
           </p:cNvSpPr>
@@ -209,7 +213,7 @@
       </p:sp>
       <p:sp>
         <p:nvSpPr>
-          <p:cNvPr id="31" name="PlaceHolder 3"/>
+          <p:cNvPr id="28" name="PlaceHolder 3"/>
           <p:cNvSpPr>
             <a:spLocks noGrp="1"/>
           </p:cNvSpPr>
@@ -235,7 +239,7 @@
       </p:sp>
       <p:sp>
         <p:nvSpPr>
-          <p:cNvPr id="32" name="PlaceHolder 4"/>
+          <p:cNvPr id="29" name="PlaceHolder 4"/>
           <p:cNvSpPr>
             <a:spLocks noGrp="1"/>
           </p:cNvSpPr>
@@ -261,7 +265,7 @@
       </p:sp>
       <p:sp>
         <p:nvSpPr>
-          <p:cNvPr id="33" name="PlaceHolder 5"/>
+          <p:cNvPr id="30" name="PlaceHolder 5"/>
           <p:cNvSpPr>
             <a:spLocks noGrp="1"/>
           </p:cNvSpPr>
@@ -309,7 +313,7 @@
       </p:grpSpPr>
       <p:sp>
         <p:nvSpPr>
-          <p:cNvPr id="34" name="PlaceHolder 1"/>
+          <p:cNvPr id="31" name="PlaceHolder 1"/>
           <p:cNvSpPr>
             <a:spLocks noGrp="1"/>
           </p:cNvSpPr>
@@ -320,7 +324,7 @@
         <p:spPr>
           <a:xfrm>
             <a:off x="685800" y="2130480"/>
-            <a:ext cx="7772040" cy="1469880"/>
+            <a:ext cx="7771680" cy="1469880"/>
           </a:xfrm>
           <a:prstGeom prst="rect">
             <a:avLst/>
@@ -329,13 +333,14 @@
         <p:txBody>
           <a:bodyPr lIns="0" rIns="0" tIns="0" bIns="0" anchor="ctr"/>
           <a:p>
-            <a:endParaRPr/>
-          </a:p>
-        </p:txBody>
-      </p:sp>
-      <p:sp>
-        <p:nvSpPr>
-          <p:cNvPr id="35" name="PlaceHolder 2"/>
+            <a:pPr algn="ctr"/>
+            <a:endParaRPr/>
+          </a:p>
+        </p:txBody>
+      </p:sp>
+      <p:sp>
+        <p:nvSpPr>
+          <p:cNvPr id="32" name="PlaceHolder 2"/>
           <p:cNvSpPr>
             <a:spLocks noGrp="1"/>
           </p:cNvSpPr>
@@ -361,7 +366,7 @@
       </p:sp>
       <p:sp>
         <p:nvSpPr>
-          <p:cNvPr id="36" name="PlaceHolder 3"/>
+          <p:cNvPr id="33" name="PlaceHolder 3"/>
           <p:cNvSpPr>
             <a:spLocks noGrp="1"/>
           </p:cNvSpPr>
@@ -387,7 +392,7 @@
       </p:sp>
       <p:pic>
         <p:nvPicPr>
-          <p:cNvPr id="37" name="" descr=""/>
+          <p:cNvPr id="34" name="" descr=""/>
           <p:cNvPicPr/>
           <p:nvPr/>
         </p:nvPicPr>
@@ -412,7 +417,7 @@
       </p:pic>
       <p:pic>
         <p:nvPicPr>
-          <p:cNvPr id="38" name="" descr=""/>
+          <p:cNvPr id="35" name="" descr=""/>
           <p:cNvPicPr/>
           <p:nvPr/>
         </p:nvPicPr>
@@ -435,6 +440,505 @@
           </a:ln>
         </p:spPr>
       </p:pic>
+    </p:spTree>
+  </p:cSld>
+</p:sldLayout>
+</file>
+
+<file path=ppt/slideLayouts/slideLayout13.xml><?xml version="1.0" encoding="utf-8"?>
+<p:sldLayout xmlns:a="http://schemas.openxmlformats.org/drawingml/2006/main" xmlns:p="http://schemas.openxmlformats.org/presentationml/2006/main" xmlns:r="http://schemas.openxmlformats.org/officeDocument/2006/relationships" type="blank" preserve="1">
+  <p:cSld name="Blank Slide">
+    <p:spTree>
+      <p:nvGrpSpPr>
+        <p:cNvPr id="1" name=""/>
+        <p:cNvGrpSpPr/>
+        <p:nvPr/>
+      </p:nvGrpSpPr>
+      <p:grpSpPr>
+        <a:xfrm>
+          <a:off x="0" y="0"/>
+          <a:ext cx="0" cy="0"/>
+          <a:chOff x="0" y="0"/>
+          <a:chExt cx="0" cy="0"/>
+        </a:xfrm>
+      </p:grpSpPr>
+    </p:spTree>
+  </p:cSld>
+</p:sldLayout>
+</file>
+
+<file path=ppt/slideLayouts/slideLayout14.xml><?xml version="1.0" encoding="utf-8"?>
+<p:sldLayout xmlns:a="http://schemas.openxmlformats.org/drawingml/2006/main" xmlns:p="http://schemas.openxmlformats.org/presentationml/2006/main" xmlns:r="http://schemas.openxmlformats.org/officeDocument/2006/relationships" type="tx" preserve="1">
+  <p:cSld name="Title Slide">
+    <p:spTree>
+      <p:nvGrpSpPr>
+        <p:cNvPr id="1" name=""/>
+        <p:cNvGrpSpPr/>
+        <p:nvPr/>
+      </p:nvGrpSpPr>
+      <p:grpSpPr>
+        <a:xfrm>
+          <a:off x="0" y="0"/>
+          <a:ext cx="0" cy="0"/>
+          <a:chOff x="0" y="0"/>
+          <a:chExt cx="0" cy="0"/>
+        </a:xfrm>
+      </p:grpSpPr>
+      <p:sp>
+        <p:nvSpPr>
+          <p:cNvPr id="38" name="PlaceHolder 1"/>
+          <p:cNvSpPr>
+            <a:spLocks noGrp="1"/>
+          </p:cNvSpPr>
+          <p:nvPr>
+            <p:ph type="title"/>
+          </p:nvPr>
+        </p:nvSpPr>
+        <p:spPr>
+          <a:xfrm>
+            <a:off x="685800" y="2130480"/>
+            <a:ext cx="7771680" cy="1469880"/>
+          </a:xfrm>
+          <a:prstGeom prst="rect">
+            <a:avLst/>
+          </a:prstGeom>
+        </p:spPr>
+        <p:txBody>
+          <a:bodyPr lIns="0" rIns="0" tIns="0" bIns="0" anchor="ctr"/>
+          <a:p>
+            <a:pPr algn="ctr"/>
+            <a:endParaRPr/>
+          </a:p>
+        </p:txBody>
+      </p:sp>
+      <p:sp>
+        <p:nvSpPr>
+          <p:cNvPr id="39" name="PlaceHolder 2"/>
+          <p:cNvSpPr>
+            <a:spLocks noGrp="1"/>
+          </p:cNvSpPr>
+          <p:nvPr>
+            <p:ph type="subTitle"/>
+          </p:nvPr>
+        </p:nvSpPr>
+        <p:spPr>
+          <a:xfrm>
+            <a:off x="457200" y="1604520"/>
+            <a:ext cx="8229240" cy="3977640"/>
+          </a:xfrm>
+          <a:prstGeom prst="rect">
+            <a:avLst/>
+          </a:prstGeom>
+        </p:spPr>
+        <p:txBody>
+          <a:bodyPr lIns="0" rIns="0" tIns="0" bIns="0" anchor="ctr"/>
+          <a:p>
+            <a:pPr algn="ctr"/>
+            <a:endParaRPr/>
+          </a:p>
+        </p:txBody>
+      </p:sp>
+    </p:spTree>
+  </p:cSld>
+</p:sldLayout>
+</file>
+
+<file path=ppt/slideLayouts/slideLayout15.xml><?xml version="1.0" encoding="utf-8"?>
+<p:sldLayout xmlns:a="http://schemas.openxmlformats.org/drawingml/2006/main" xmlns:p="http://schemas.openxmlformats.org/presentationml/2006/main" xmlns:r="http://schemas.openxmlformats.org/officeDocument/2006/relationships" type="obj" preserve="1">
+  <p:cSld name="Title, Content">
+    <p:spTree>
+      <p:nvGrpSpPr>
+        <p:cNvPr id="1" name=""/>
+        <p:cNvGrpSpPr/>
+        <p:nvPr/>
+      </p:nvGrpSpPr>
+      <p:grpSpPr>
+        <a:xfrm>
+          <a:off x="0" y="0"/>
+          <a:ext cx="0" cy="0"/>
+          <a:chOff x="0" y="0"/>
+          <a:chExt cx="0" cy="0"/>
+        </a:xfrm>
+      </p:grpSpPr>
+      <p:sp>
+        <p:nvSpPr>
+          <p:cNvPr id="40" name="PlaceHolder 1"/>
+          <p:cNvSpPr>
+            <a:spLocks noGrp="1"/>
+          </p:cNvSpPr>
+          <p:nvPr>
+            <p:ph type="title"/>
+          </p:nvPr>
+        </p:nvSpPr>
+        <p:spPr>
+          <a:xfrm>
+            <a:off x="685800" y="2130480"/>
+            <a:ext cx="7771680" cy="1469880"/>
+          </a:xfrm>
+          <a:prstGeom prst="rect">
+            <a:avLst/>
+          </a:prstGeom>
+        </p:spPr>
+        <p:txBody>
+          <a:bodyPr lIns="0" rIns="0" tIns="0" bIns="0" anchor="ctr"/>
+          <a:p>
+            <a:pPr algn="ctr"/>
+            <a:endParaRPr/>
+          </a:p>
+        </p:txBody>
+      </p:sp>
+      <p:sp>
+        <p:nvSpPr>
+          <p:cNvPr id="41" name="PlaceHolder 2"/>
+          <p:cNvSpPr>
+            <a:spLocks noGrp="1"/>
+          </p:cNvSpPr>
+          <p:nvPr>
+            <p:ph type="body"/>
+          </p:nvPr>
+        </p:nvSpPr>
+        <p:spPr>
+          <a:xfrm>
+            <a:off x="457200" y="1604520"/>
+            <a:ext cx="8229240" cy="3977280"/>
+          </a:xfrm>
+          <a:prstGeom prst="rect">
+            <a:avLst/>
+          </a:prstGeom>
+        </p:spPr>
+        <p:txBody>
+          <a:bodyPr lIns="0" rIns="0" tIns="0" bIns="0"/>
+          <a:p>
+            <a:endParaRPr/>
+          </a:p>
+        </p:txBody>
+      </p:sp>
+    </p:spTree>
+  </p:cSld>
+</p:sldLayout>
+</file>
+
+<file path=ppt/slideLayouts/slideLayout16.xml><?xml version="1.0" encoding="utf-8"?>
+<p:sldLayout xmlns:a="http://schemas.openxmlformats.org/drawingml/2006/main" xmlns:p="http://schemas.openxmlformats.org/presentationml/2006/main" xmlns:r="http://schemas.openxmlformats.org/officeDocument/2006/relationships" type="twoObj" preserve="1">
+  <p:cSld name="Title, 2 Content">
+    <p:spTree>
+      <p:nvGrpSpPr>
+        <p:cNvPr id="1" name=""/>
+        <p:cNvGrpSpPr/>
+        <p:nvPr/>
+      </p:nvGrpSpPr>
+      <p:grpSpPr>
+        <a:xfrm>
+          <a:off x="0" y="0"/>
+          <a:ext cx="0" cy="0"/>
+          <a:chOff x="0" y="0"/>
+          <a:chExt cx="0" cy="0"/>
+        </a:xfrm>
+      </p:grpSpPr>
+      <p:sp>
+        <p:nvSpPr>
+          <p:cNvPr id="42" name="PlaceHolder 1"/>
+          <p:cNvSpPr>
+            <a:spLocks noGrp="1"/>
+          </p:cNvSpPr>
+          <p:nvPr>
+            <p:ph type="title"/>
+          </p:nvPr>
+        </p:nvSpPr>
+        <p:spPr>
+          <a:xfrm>
+            <a:off x="685800" y="2130480"/>
+            <a:ext cx="7771680" cy="1469880"/>
+          </a:xfrm>
+          <a:prstGeom prst="rect">
+            <a:avLst/>
+          </a:prstGeom>
+        </p:spPr>
+        <p:txBody>
+          <a:bodyPr lIns="0" rIns="0" tIns="0" bIns="0" anchor="ctr"/>
+          <a:p>
+            <a:pPr algn="ctr"/>
+            <a:endParaRPr/>
+          </a:p>
+        </p:txBody>
+      </p:sp>
+      <p:sp>
+        <p:nvSpPr>
+          <p:cNvPr id="43" name="PlaceHolder 2"/>
+          <p:cNvSpPr>
+            <a:spLocks noGrp="1"/>
+          </p:cNvSpPr>
+          <p:nvPr>
+            <p:ph type="body"/>
+          </p:nvPr>
+        </p:nvSpPr>
+        <p:spPr>
+          <a:xfrm>
+            <a:off x="457200" y="1604520"/>
+            <a:ext cx="4015800" cy="3977280"/>
+          </a:xfrm>
+          <a:prstGeom prst="rect">
+            <a:avLst/>
+          </a:prstGeom>
+        </p:spPr>
+        <p:txBody>
+          <a:bodyPr lIns="0" rIns="0" tIns="0" bIns="0"/>
+          <a:p>
+            <a:endParaRPr/>
+          </a:p>
+        </p:txBody>
+      </p:sp>
+      <p:sp>
+        <p:nvSpPr>
+          <p:cNvPr id="44" name="PlaceHolder 3"/>
+          <p:cNvSpPr>
+            <a:spLocks noGrp="1"/>
+          </p:cNvSpPr>
+          <p:nvPr>
+            <p:ph type="body"/>
+          </p:nvPr>
+        </p:nvSpPr>
+        <p:spPr>
+          <a:xfrm>
+            <a:off x="4674240" y="1604520"/>
+            <a:ext cx="4015800" cy="3977280"/>
+          </a:xfrm>
+          <a:prstGeom prst="rect">
+            <a:avLst/>
+          </a:prstGeom>
+        </p:spPr>
+        <p:txBody>
+          <a:bodyPr lIns="0" rIns="0" tIns="0" bIns="0"/>
+          <a:p>
+            <a:endParaRPr/>
+          </a:p>
+        </p:txBody>
+      </p:sp>
+    </p:spTree>
+  </p:cSld>
+</p:sldLayout>
+</file>
+
+<file path=ppt/slideLayouts/slideLayout17.xml><?xml version="1.0" encoding="utf-8"?>
+<p:sldLayout xmlns:a="http://schemas.openxmlformats.org/drawingml/2006/main" xmlns:p="http://schemas.openxmlformats.org/presentationml/2006/main" xmlns:r="http://schemas.openxmlformats.org/officeDocument/2006/relationships" type="titleOnly" preserve="1">
+  <p:cSld name="Title Only">
+    <p:spTree>
+      <p:nvGrpSpPr>
+        <p:cNvPr id="1" name=""/>
+        <p:cNvGrpSpPr/>
+        <p:nvPr/>
+      </p:nvGrpSpPr>
+      <p:grpSpPr>
+        <a:xfrm>
+          <a:off x="0" y="0"/>
+          <a:ext cx="0" cy="0"/>
+          <a:chOff x="0" y="0"/>
+          <a:chExt cx="0" cy="0"/>
+        </a:xfrm>
+      </p:grpSpPr>
+      <p:sp>
+        <p:nvSpPr>
+          <p:cNvPr id="45" name="PlaceHolder 1"/>
+          <p:cNvSpPr>
+            <a:spLocks noGrp="1"/>
+          </p:cNvSpPr>
+          <p:nvPr>
+            <p:ph type="title"/>
+          </p:nvPr>
+        </p:nvSpPr>
+        <p:spPr>
+          <a:xfrm>
+            <a:off x="685800" y="2130480"/>
+            <a:ext cx="7771680" cy="1469880"/>
+          </a:xfrm>
+          <a:prstGeom prst="rect">
+            <a:avLst/>
+          </a:prstGeom>
+        </p:spPr>
+        <p:txBody>
+          <a:bodyPr lIns="0" rIns="0" tIns="0" bIns="0" anchor="ctr"/>
+          <a:p>
+            <a:pPr algn="ctr"/>
+            <a:endParaRPr/>
+          </a:p>
+        </p:txBody>
+      </p:sp>
+    </p:spTree>
+  </p:cSld>
+</p:sldLayout>
+</file>
+
+<file path=ppt/slideLayouts/slideLayout18.xml><?xml version="1.0" encoding="utf-8"?>
+<p:sldLayout xmlns:a="http://schemas.openxmlformats.org/drawingml/2006/main" xmlns:p="http://schemas.openxmlformats.org/presentationml/2006/main" xmlns:r="http://schemas.openxmlformats.org/officeDocument/2006/relationships" type="objOnly" preserve="1">
+  <p:cSld name="Centered Text">
+    <p:spTree>
+      <p:nvGrpSpPr>
+        <p:cNvPr id="1" name=""/>
+        <p:cNvGrpSpPr/>
+        <p:nvPr/>
+      </p:nvGrpSpPr>
+      <p:grpSpPr>
+        <a:xfrm>
+          <a:off x="0" y="0"/>
+          <a:ext cx="0" cy="0"/>
+          <a:chOff x="0" y="0"/>
+          <a:chExt cx="0" cy="0"/>
+        </a:xfrm>
+      </p:grpSpPr>
+      <p:sp>
+        <p:nvSpPr>
+          <p:cNvPr id="46" name="PlaceHolder 1"/>
+          <p:cNvSpPr>
+            <a:spLocks noGrp="1"/>
+          </p:cNvSpPr>
+          <p:nvPr>
+            <p:ph type="subTitle"/>
+          </p:nvPr>
+        </p:nvSpPr>
+        <p:spPr>
+          <a:xfrm>
+            <a:off x="685800" y="2130480"/>
+            <a:ext cx="7771680" cy="6813360"/>
+          </a:xfrm>
+          <a:prstGeom prst="rect">
+            <a:avLst/>
+          </a:prstGeom>
+        </p:spPr>
+        <p:txBody>
+          <a:bodyPr lIns="0" rIns="0" tIns="0" bIns="0" anchor="ctr"/>
+          <a:p>
+            <a:pPr algn="ctr"/>
+            <a:endParaRPr/>
+          </a:p>
+        </p:txBody>
+      </p:sp>
+    </p:spTree>
+  </p:cSld>
+</p:sldLayout>
+</file>
+
+<file path=ppt/slideLayouts/slideLayout19.xml><?xml version="1.0" encoding="utf-8"?>
+<p:sldLayout xmlns:a="http://schemas.openxmlformats.org/drawingml/2006/main" xmlns:p="http://schemas.openxmlformats.org/presentationml/2006/main" xmlns:r="http://schemas.openxmlformats.org/officeDocument/2006/relationships" type="twoObjAndObj" preserve="1">
+  <p:cSld name="Title, 2 Content and Content">
+    <p:spTree>
+      <p:nvGrpSpPr>
+        <p:cNvPr id="1" name=""/>
+        <p:cNvGrpSpPr/>
+        <p:nvPr/>
+      </p:nvGrpSpPr>
+      <p:grpSpPr>
+        <a:xfrm>
+          <a:off x="0" y="0"/>
+          <a:ext cx="0" cy="0"/>
+          <a:chOff x="0" y="0"/>
+          <a:chExt cx="0" cy="0"/>
+        </a:xfrm>
+      </p:grpSpPr>
+      <p:sp>
+        <p:nvSpPr>
+          <p:cNvPr id="47" name="PlaceHolder 1"/>
+          <p:cNvSpPr>
+            <a:spLocks noGrp="1"/>
+          </p:cNvSpPr>
+          <p:nvPr>
+            <p:ph type="title"/>
+          </p:nvPr>
+        </p:nvSpPr>
+        <p:spPr>
+          <a:xfrm>
+            <a:off x="685800" y="2130480"/>
+            <a:ext cx="7771680" cy="1469880"/>
+          </a:xfrm>
+          <a:prstGeom prst="rect">
+            <a:avLst/>
+          </a:prstGeom>
+        </p:spPr>
+        <p:txBody>
+          <a:bodyPr lIns="0" rIns="0" tIns="0" bIns="0" anchor="ctr"/>
+          <a:p>
+            <a:pPr algn="ctr"/>
+            <a:endParaRPr/>
+          </a:p>
+        </p:txBody>
+      </p:sp>
+      <p:sp>
+        <p:nvSpPr>
+          <p:cNvPr id="48" name="PlaceHolder 2"/>
+          <p:cNvSpPr>
+            <a:spLocks noGrp="1"/>
+          </p:cNvSpPr>
+          <p:nvPr>
+            <p:ph type="body"/>
+          </p:nvPr>
+        </p:nvSpPr>
+        <p:spPr>
+          <a:xfrm>
+            <a:off x="457200" y="1604520"/>
+            <a:ext cx="4015800" cy="1896840"/>
+          </a:xfrm>
+          <a:prstGeom prst="rect">
+            <a:avLst/>
+          </a:prstGeom>
+        </p:spPr>
+        <p:txBody>
+          <a:bodyPr lIns="0" rIns="0" tIns="0" bIns="0"/>
+          <a:p>
+            <a:endParaRPr/>
+          </a:p>
+        </p:txBody>
+      </p:sp>
+      <p:sp>
+        <p:nvSpPr>
+          <p:cNvPr id="49" name="PlaceHolder 3"/>
+          <p:cNvSpPr>
+            <a:spLocks noGrp="1"/>
+          </p:cNvSpPr>
+          <p:nvPr>
+            <p:ph type="body"/>
+          </p:nvPr>
+        </p:nvSpPr>
+        <p:spPr>
+          <a:xfrm>
+            <a:off x="457200" y="3682080"/>
+            <a:ext cx="4015800" cy="1896840"/>
+          </a:xfrm>
+          <a:prstGeom prst="rect">
+            <a:avLst/>
+          </a:prstGeom>
+        </p:spPr>
+        <p:txBody>
+          <a:bodyPr lIns="0" rIns="0" tIns="0" bIns="0"/>
+          <a:p>
+            <a:endParaRPr/>
+          </a:p>
+        </p:txBody>
+      </p:sp>
+      <p:sp>
+        <p:nvSpPr>
+          <p:cNvPr id="50" name="PlaceHolder 4"/>
+          <p:cNvSpPr>
+            <a:spLocks noGrp="1"/>
+          </p:cNvSpPr>
+          <p:nvPr>
+            <p:ph type="body"/>
+          </p:nvPr>
+        </p:nvSpPr>
+        <p:spPr>
+          <a:xfrm>
+            <a:off x="4674240" y="1604520"/>
+            <a:ext cx="4015800" cy="3977280"/>
+          </a:xfrm>
+          <a:prstGeom prst="rect">
+            <a:avLst/>
+          </a:prstGeom>
+        </p:spPr>
+        <p:txBody>
+          <a:bodyPr lIns="0" rIns="0" tIns="0" bIns="0"/>
+          <a:p>
+            <a:endParaRPr/>
+          </a:p>
+        </p:txBody>
+      </p:sp>
     </p:spTree>
   </p:cSld>
 </p:sldLayout>
@@ -459,7 +963,7 @@
       </p:grpSpPr>
       <p:sp>
         <p:nvSpPr>
-          <p:cNvPr id="5" name="PlaceHolder 1"/>
+          <p:cNvPr id="2" name="PlaceHolder 1"/>
           <p:cNvSpPr>
             <a:spLocks noGrp="1"/>
           </p:cNvSpPr>
@@ -470,7 +974,7 @@
         <p:spPr>
           <a:xfrm>
             <a:off x="685800" y="2130480"/>
-            <a:ext cx="7772040" cy="1469880"/>
+            <a:ext cx="7771680" cy="1469880"/>
           </a:xfrm>
           <a:prstGeom prst="rect">
             <a:avLst/>
@@ -479,13 +983,14 @@
         <p:txBody>
           <a:bodyPr lIns="0" rIns="0" tIns="0" bIns="0" anchor="ctr"/>
           <a:p>
-            <a:endParaRPr/>
-          </a:p>
-        </p:txBody>
-      </p:sp>
-      <p:sp>
-        <p:nvSpPr>
-          <p:cNvPr id="6" name="PlaceHolder 2"/>
+            <a:pPr algn="ctr"/>
+            <a:endParaRPr/>
+          </a:p>
+        </p:txBody>
+      </p:sp>
+      <p:sp>
+        <p:nvSpPr>
+          <p:cNvPr id="3" name="PlaceHolder 2"/>
           <p:cNvSpPr>
             <a:spLocks noGrp="1"/>
           </p:cNvSpPr>
@@ -510,6 +1015,665 @@
           </a:p>
         </p:txBody>
       </p:sp>
+    </p:spTree>
+  </p:cSld>
+</p:sldLayout>
+</file>
+
+<file path=ppt/slideLayouts/slideLayout20.xml><?xml version="1.0" encoding="utf-8"?>
+<p:sldLayout xmlns:a="http://schemas.openxmlformats.org/drawingml/2006/main" xmlns:p="http://schemas.openxmlformats.org/presentationml/2006/main" xmlns:r="http://schemas.openxmlformats.org/officeDocument/2006/relationships" type="objAndTwoObj" preserve="1">
+  <p:cSld name="Title Content and 2 Content">
+    <p:spTree>
+      <p:nvGrpSpPr>
+        <p:cNvPr id="1" name=""/>
+        <p:cNvGrpSpPr/>
+        <p:nvPr/>
+      </p:nvGrpSpPr>
+      <p:grpSpPr>
+        <a:xfrm>
+          <a:off x="0" y="0"/>
+          <a:ext cx="0" cy="0"/>
+          <a:chOff x="0" y="0"/>
+          <a:chExt cx="0" cy="0"/>
+        </a:xfrm>
+      </p:grpSpPr>
+      <p:sp>
+        <p:nvSpPr>
+          <p:cNvPr id="51" name="PlaceHolder 1"/>
+          <p:cNvSpPr>
+            <a:spLocks noGrp="1"/>
+          </p:cNvSpPr>
+          <p:nvPr>
+            <p:ph type="title"/>
+          </p:nvPr>
+        </p:nvSpPr>
+        <p:spPr>
+          <a:xfrm>
+            <a:off x="685800" y="2130480"/>
+            <a:ext cx="7771680" cy="1469880"/>
+          </a:xfrm>
+          <a:prstGeom prst="rect">
+            <a:avLst/>
+          </a:prstGeom>
+        </p:spPr>
+        <p:txBody>
+          <a:bodyPr lIns="0" rIns="0" tIns="0" bIns="0" anchor="ctr"/>
+          <a:p>
+            <a:pPr algn="ctr"/>
+            <a:endParaRPr/>
+          </a:p>
+        </p:txBody>
+      </p:sp>
+      <p:sp>
+        <p:nvSpPr>
+          <p:cNvPr id="52" name="PlaceHolder 2"/>
+          <p:cNvSpPr>
+            <a:spLocks noGrp="1"/>
+          </p:cNvSpPr>
+          <p:nvPr>
+            <p:ph type="body"/>
+          </p:nvPr>
+        </p:nvSpPr>
+        <p:spPr>
+          <a:xfrm>
+            <a:off x="457200" y="1604520"/>
+            <a:ext cx="4015800" cy="3977280"/>
+          </a:xfrm>
+          <a:prstGeom prst="rect">
+            <a:avLst/>
+          </a:prstGeom>
+        </p:spPr>
+        <p:txBody>
+          <a:bodyPr lIns="0" rIns="0" tIns="0" bIns="0"/>
+          <a:p>
+            <a:endParaRPr/>
+          </a:p>
+        </p:txBody>
+      </p:sp>
+      <p:sp>
+        <p:nvSpPr>
+          <p:cNvPr id="53" name="PlaceHolder 3"/>
+          <p:cNvSpPr>
+            <a:spLocks noGrp="1"/>
+          </p:cNvSpPr>
+          <p:nvPr>
+            <p:ph type="body"/>
+          </p:nvPr>
+        </p:nvSpPr>
+        <p:spPr>
+          <a:xfrm>
+            <a:off x="4674240" y="1604520"/>
+            <a:ext cx="4015800" cy="1896840"/>
+          </a:xfrm>
+          <a:prstGeom prst="rect">
+            <a:avLst/>
+          </a:prstGeom>
+        </p:spPr>
+        <p:txBody>
+          <a:bodyPr lIns="0" rIns="0" tIns="0" bIns="0"/>
+          <a:p>
+            <a:endParaRPr/>
+          </a:p>
+        </p:txBody>
+      </p:sp>
+      <p:sp>
+        <p:nvSpPr>
+          <p:cNvPr id="54" name="PlaceHolder 4"/>
+          <p:cNvSpPr>
+            <a:spLocks noGrp="1"/>
+          </p:cNvSpPr>
+          <p:nvPr>
+            <p:ph type="body"/>
+          </p:nvPr>
+        </p:nvSpPr>
+        <p:spPr>
+          <a:xfrm>
+            <a:off x="4674240" y="3682080"/>
+            <a:ext cx="4015800" cy="1896840"/>
+          </a:xfrm>
+          <a:prstGeom prst="rect">
+            <a:avLst/>
+          </a:prstGeom>
+        </p:spPr>
+        <p:txBody>
+          <a:bodyPr lIns="0" rIns="0" tIns="0" bIns="0"/>
+          <a:p>
+            <a:endParaRPr/>
+          </a:p>
+        </p:txBody>
+      </p:sp>
+    </p:spTree>
+  </p:cSld>
+</p:sldLayout>
+</file>
+
+<file path=ppt/slideLayouts/slideLayout21.xml><?xml version="1.0" encoding="utf-8"?>
+<p:sldLayout xmlns:a="http://schemas.openxmlformats.org/drawingml/2006/main" xmlns:p="http://schemas.openxmlformats.org/presentationml/2006/main" xmlns:r="http://schemas.openxmlformats.org/officeDocument/2006/relationships" type="twoObjOverTx" preserve="1">
+  <p:cSld name="Title, 2 Content over Content">
+    <p:spTree>
+      <p:nvGrpSpPr>
+        <p:cNvPr id="1" name=""/>
+        <p:cNvGrpSpPr/>
+        <p:nvPr/>
+      </p:nvGrpSpPr>
+      <p:grpSpPr>
+        <a:xfrm>
+          <a:off x="0" y="0"/>
+          <a:ext cx="0" cy="0"/>
+          <a:chOff x="0" y="0"/>
+          <a:chExt cx="0" cy="0"/>
+        </a:xfrm>
+      </p:grpSpPr>
+      <p:sp>
+        <p:nvSpPr>
+          <p:cNvPr id="55" name="PlaceHolder 1"/>
+          <p:cNvSpPr>
+            <a:spLocks noGrp="1"/>
+          </p:cNvSpPr>
+          <p:nvPr>
+            <p:ph type="title"/>
+          </p:nvPr>
+        </p:nvSpPr>
+        <p:spPr>
+          <a:xfrm>
+            <a:off x="685800" y="2130480"/>
+            <a:ext cx="7771680" cy="1469880"/>
+          </a:xfrm>
+          <a:prstGeom prst="rect">
+            <a:avLst/>
+          </a:prstGeom>
+        </p:spPr>
+        <p:txBody>
+          <a:bodyPr lIns="0" rIns="0" tIns="0" bIns="0" anchor="ctr"/>
+          <a:p>
+            <a:pPr algn="ctr"/>
+            <a:endParaRPr/>
+          </a:p>
+        </p:txBody>
+      </p:sp>
+      <p:sp>
+        <p:nvSpPr>
+          <p:cNvPr id="56" name="PlaceHolder 2"/>
+          <p:cNvSpPr>
+            <a:spLocks noGrp="1"/>
+          </p:cNvSpPr>
+          <p:nvPr>
+            <p:ph type="body"/>
+          </p:nvPr>
+        </p:nvSpPr>
+        <p:spPr>
+          <a:xfrm>
+            <a:off x="457200" y="1604520"/>
+            <a:ext cx="4015800" cy="1896840"/>
+          </a:xfrm>
+          <a:prstGeom prst="rect">
+            <a:avLst/>
+          </a:prstGeom>
+        </p:spPr>
+        <p:txBody>
+          <a:bodyPr lIns="0" rIns="0" tIns="0" bIns="0"/>
+          <a:p>
+            <a:endParaRPr/>
+          </a:p>
+        </p:txBody>
+      </p:sp>
+      <p:sp>
+        <p:nvSpPr>
+          <p:cNvPr id="57" name="PlaceHolder 3"/>
+          <p:cNvSpPr>
+            <a:spLocks noGrp="1"/>
+          </p:cNvSpPr>
+          <p:nvPr>
+            <p:ph type="body"/>
+          </p:nvPr>
+        </p:nvSpPr>
+        <p:spPr>
+          <a:xfrm>
+            <a:off x="4674240" y="1604520"/>
+            <a:ext cx="4015800" cy="1896840"/>
+          </a:xfrm>
+          <a:prstGeom prst="rect">
+            <a:avLst/>
+          </a:prstGeom>
+        </p:spPr>
+        <p:txBody>
+          <a:bodyPr lIns="0" rIns="0" tIns="0" bIns="0"/>
+          <a:p>
+            <a:endParaRPr/>
+          </a:p>
+        </p:txBody>
+      </p:sp>
+      <p:sp>
+        <p:nvSpPr>
+          <p:cNvPr id="58" name="PlaceHolder 4"/>
+          <p:cNvSpPr>
+            <a:spLocks noGrp="1"/>
+          </p:cNvSpPr>
+          <p:nvPr>
+            <p:ph type="body"/>
+          </p:nvPr>
+        </p:nvSpPr>
+        <p:spPr>
+          <a:xfrm>
+            <a:off x="457200" y="3682080"/>
+            <a:ext cx="8229240" cy="1896840"/>
+          </a:xfrm>
+          <a:prstGeom prst="rect">
+            <a:avLst/>
+          </a:prstGeom>
+        </p:spPr>
+        <p:txBody>
+          <a:bodyPr lIns="0" rIns="0" tIns="0" bIns="0"/>
+          <a:p>
+            <a:endParaRPr/>
+          </a:p>
+        </p:txBody>
+      </p:sp>
+    </p:spTree>
+  </p:cSld>
+</p:sldLayout>
+</file>
+
+<file path=ppt/slideLayouts/slideLayout22.xml><?xml version="1.0" encoding="utf-8"?>
+<p:sldLayout xmlns:a="http://schemas.openxmlformats.org/drawingml/2006/main" xmlns:p="http://schemas.openxmlformats.org/presentationml/2006/main" xmlns:r="http://schemas.openxmlformats.org/officeDocument/2006/relationships" type="objOverTx" preserve="1">
+  <p:cSld name="Title, Content over Content">
+    <p:spTree>
+      <p:nvGrpSpPr>
+        <p:cNvPr id="1" name=""/>
+        <p:cNvGrpSpPr/>
+        <p:nvPr/>
+      </p:nvGrpSpPr>
+      <p:grpSpPr>
+        <a:xfrm>
+          <a:off x="0" y="0"/>
+          <a:ext cx="0" cy="0"/>
+          <a:chOff x="0" y="0"/>
+          <a:chExt cx="0" cy="0"/>
+        </a:xfrm>
+      </p:grpSpPr>
+      <p:sp>
+        <p:nvSpPr>
+          <p:cNvPr id="59" name="PlaceHolder 1"/>
+          <p:cNvSpPr>
+            <a:spLocks noGrp="1"/>
+          </p:cNvSpPr>
+          <p:nvPr>
+            <p:ph type="title"/>
+          </p:nvPr>
+        </p:nvSpPr>
+        <p:spPr>
+          <a:xfrm>
+            <a:off x="685800" y="2130480"/>
+            <a:ext cx="7771680" cy="1469880"/>
+          </a:xfrm>
+          <a:prstGeom prst="rect">
+            <a:avLst/>
+          </a:prstGeom>
+        </p:spPr>
+        <p:txBody>
+          <a:bodyPr lIns="0" rIns="0" tIns="0" bIns="0" anchor="ctr"/>
+          <a:p>
+            <a:pPr algn="ctr"/>
+            <a:endParaRPr/>
+          </a:p>
+        </p:txBody>
+      </p:sp>
+      <p:sp>
+        <p:nvSpPr>
+          <p:cNvPr id="60" name="PlaceHolder 2"/>
+          <p:cNvSpPr>
+            <a:spLocks noGrp="1"/>
+          </p:cNvSpPr>
+          <p:nvPr>
+            <p:ph type="body"/>
+          </p:nvPr>
+        </p:nvSpPr>
+        <p:spPr>
+          <a:xfrm>
+            <a:off x="457200" y="1604520"/>
+            <a:ext cx="8229240" cy="1896840"/>
+          </a:xfrm>
+          <a:prstGeom prst="rect">
+            <a:avLst/>
+          </a:prstGeom>
+        </p:spPr>
+        <p:txBody>
+          <a:bodyPr lIns="0" rIns="0" tIns="0" bIns="0"/>
+          <a:p>
+            <a:endParaRPr/>
+          </a:p>
+        </p:txBody>
+      </p:sp>
+      <p:sp>
+        <p:nvSpPr>
+          <p:cNvPr id="61" name="PlaceHolder 3"/>
+          <p:cNvSpPr>
+            <a:spLocks noGrp="1"/>
+          </p:cNvSpPr>
+          <p:nvPr>
+            <p:ph type="body"/>
+          </p:nvPr>
+        </p:nvSpPr>
+        <p:spPr>
+          <a:xfrm>
+            <a:off x="457200" y="3682080"/>
+            <a:ext cx="8229240" cy="1896840"/>
+          </a:xfrm>
+          <a:prstGeom prst="rect">
+            <a:avLst/>
+          </a:prstGeom>
+        </p:spPr>
+        <p:txBody>
+          <a:bodyPr lIns="0" rIns="0" tIns="0" bIns="0"/>
+          <a:p>
+            <a:endParaRPr/>
+          </a:p>
+        </p:txBody>
+      </p:sp>
+    </p:spTree>
+  </p:cSld>
+</p:sldLayout>
+</file>
+
+<file path=ppt/slideLayouts/slideLayout23.xml><?xml version="1.0" encoding="utf-8"?>
+<p:sldLayout xmlns:a="http://schemas.openxmlformats.org/drawingml/2006/main" xmlns:p="http://schemas.openxmlformats.org/presentationml/2006/main" xmlns:r="http://schemas.openxmlformats.org/officeDocument/2006/relationships" type="fourObj" preserve="1">
+  <p:cSld name="Title, 4 Content">
+    <p:spTree>
+      <p:nvGrpSpPr>
+        <p:cNvPr id="1" name=""/>
+        <p:cNvGrpSpPr/>
+        <p:nvPr/>
+      </p:nvGrpSpPr>
+      <p:grpSpPr>
+        <a:xfrm>
+          <a:off x="0" y="0"/>
+          <a:ext cx="0" cy="0"/>
+          <a:chOff x="0" y="0"/>
+          <a:chExt cx="0" cy="0"/>
+        </a:xfrm>
+      </p:grpSpPr>
+      <p:sp>
+        <p:nvSpPr>
+          <p:cNvPr id="62" name="PlaceHolder 1"/>
+          <p:cNvSpPr>
+            <a:spLocks noGrp="1"/>
+          </p:cNvSpPr>
+          <p:nvPr>
+            <p:ph type="title"/>
+          </p:nvPr>
+        </p:nvSpPr>
+        <p:spPr>
+          <a:xfrm>
+            <a:off x="685800" y="2130480"/>
+            <a:ext cx="7771680" cy="1469880"/>
+          </a:xfrm>
+          <a:prstGeom prst="rect">
+            <a:avLst/>
+          </a:prstGeom>
+        </p:spPr>
+        <p:txBody>
+          <a:bodyPr lIns="0" rIns="0" tIns="0" bIns="0" anchor="ctr"/>
+          <a:p>
+            <a:pPr algn="ctr"/>
+            <a:endParaRPr/>
+          </a:p>
+        </p:txBody>
+      </p:sp>
+      <p:sp>
+        <p:nvSpPr>
+          <p:cNvPr id="63" name="PlaceHolder 2"/>
+          <p:cNvSpPr>
+            <a:spLocks noGrp="1"/>
+          </p:cNvSpPr>
+          <p:nvPr>
+            <p:ph type="body"/>
+          </p:nvPr>
+        </p:nvSpPr>
+        <p:spPr>
+          <a:xfrm>
+            <a:off x="457200" y="1604520"/>
+            <a:ext cx="4015800" cy="1896840"/>
+          </a:xfrm>
+          <a:prstGeom prst="rect">
+            <a:avLst/>
+          </a:prstGeom>
+        </p:spPr>
+        <p:txBody>
+          <a:bodyPr lIns="0" rIns="0" tIns="0" bIns="0"/>
+          <a:p>
+            <a:endParaRPr/>
+          </a:p>
+        </p:txBody>
+      </p:sp>
+      <p:sp>
+        <p:nvSpPr>
+          <p:cNvPr id="64" name="PlaceHolder 3"/>
+          <p:cNvSpPr>
+            <a:spLocks noGrp="1"/>
+          </p:cNvSpPr>
+          <p:nvPr>
+            <p:ph type="body"/>
+          </p:nvPr>
+        </p:nvSpPr>
+        <p:spPr>
+          <a:xfrm>
+            <a:off x="4674240" y="1604520"/>
+            <a:ext cx="4015800" cy="1896840"/>
+          </a:xfrm>
+          <a:prstGeom prst="rect">
+            <a:avLst/>
+          </a:prstGeom>
+        </p:spPr>
+        <p:txBody>
+          <a:bodyPr lIns="0" rIns="0" tIns="0" bIns="0"/>
+          <a:p>
+            <a:endParaRPr/>
+          </a:p>
+        </p:txBody>
+      </p:sp>
+      <p:sp>
+        <p:nvSpPr>
+          <p:cNvPr id="65" name="PlaceHolder 4"/>
+          <p:cNvSpPr>
+            <a:spLocks noGrp="1"/>
+          </p:cNvSpPr>
+          <p:nvPr>
+            <p:ph type="body"/>
+          </p:nvPr>
+        </p:nvSpPr>
+        <p:spPr>
+          <a:xfrm>
+            <a:off x="4674240" y="3682080"/>
+            <a:ext cx="4015800" cy="1896840"/>
+          </a:xfrm>
+          <a:prstGeom prst="rect">
+            <a:avLst/>
+          </a:prstGeom>
+        </p:spPr>
+        <p:txBody>
+          <a:bodyPr lIns="0" rIns="0" tIns="0" bIns="0"/>
+          <a:p>
+            <a:endParaRPr/>
+          </a:p>
+        </p:txBody>
+      </p:sp>
+      <p:sp>
+        <p:nvSpPr>
+          <p:cNvPr id="66" name="PlaceHolder 5"/>
+          <p:cNvSpPr>
+            <a:spLocks noGrp="1"/>
+          </p:cNvSpPr>
+          <p:nvPr>
+            <p:ph type="body"/>
+          </p:nvPr>
+        </p:nvSpPr>
+        <p:spPr>
+          <a:xfrm>
+            <a:off x="457200" y="3682080"/>
+            <a:ext cx="4015800" cy="1896840"/>
+          </a:xfrm>
+          <a:prstGeom prst="rect">
+            <a:avLst/>
+          </a:prstGeom>
+        </p:spPr>
+        <p:txBody>
+          <a:bodyPr lIns="0" rIns="0" tIns="0" bIns="0"/>
+          <a:p>
+            <a:endParaRPr/>
+          </a:p>
+        </p:txBody>
+      </p:sp>
+    </p:spTree>
+  </p:cSld>
+</p:sldLayout>
+</file>
+
+<file path=ppt/slideLayouts/slideLayout24.xml><?xml version="1.0" encoding="utf-8"?>
+<p:sldLayout xmlns:a="http://schemas.openxmlformats.org/drawingml/2006/main" xmlns:p="http://schemas.openxmlformats.org/presentationml/2006/main" xmlns:r="http://schemas.openxmlformats.org/officeDocument/2006/relationships" type="blank" preserve="1">
+  <p:cSld name="Title, 6 Content">
+    <p:spTree>
+      <p:nvGrpSpPr>
+        <p:cNvPr id="1" name=""/>
+        <p:cNvGrpSpPr/>
+        <p:nvPr/>
+      </p:nvGrpSpPr>
+      <p:grpSpPr>
+        <a:xfrm>
+          <a:off x="0" y="0"/>
+          <a:ext cx="0" cy="0"/>
+          <a:chOff x="0" y="0"/>
+          <a:chExt cx="0" cy="0"/>
+        </a:xfrm>
+      </p:grpSpPr>
+      <p:sp>
+        <p:nvSpPr>
+          <p:cNvPr id="67" name="PlaceHolder 1"/>
+          <p:cNvSpPr>
+            <a:spLocks noGrp="1"/>
+          </p:cNvSpPr>
+          <p:nvPr>
+            <p:ph type="title"/>
+          </p:nvPr>
+        </p:nvSpPr>
+        <p:spPr>
+          <a:xfrm>
+            <a:off x="685800" y="2130480"/>
+            <a:ext cx="7771680" cy="1469880"/>
+          </a:xfrm>
+          <a:prstGeom prst="rect">
+            <a:avLst/>
+          </a:prstGeom>
+        </p:spPr>
+        <p:txBody>
+          <a:bodyPr lIns="0" rIns="0" tIns="0" bIns="0" anchor="ctr"/>
+          <a:p>
+            <a:pPr algn="ctr"/>
+            <a:endParaRPr/>
+          </a:p>
+        </p:txBody>
+      </p:sp>
+      <p:sp>
+        <p:nvSpPr>
+          <p:cNvPr id="68" name="PlaceHolder 2"/>
+          <p:cNvSpPr>
+            <a:spLocks noGrp="1"/>
+          </p:cNvSpPr>
+          <p:nvPr>
+            <p:ph type="body"/>
+          </p:nvPr>
+        </p:nvSpPr>
+        <p:spPr>
+          <a:xfrm>
+            <a:off x="457200" y="1604520"/>
+            <a:ext cx="8229240" cy="3977280"/>
+          </a:xfrm>
+          <a:prstGeom prst="rect">
+            <a:avLst/>
+          </a:prstGeom>
+        </p:spPr>
+        <p:txBody>
+          <a:bodyPr lIns="0" rIns="0" tIns="0" bIns="0"/>
+          <a:p>
+            <a:endParaRPr/>
+          </a:p>
+        </p:txBody>
+      </p:sp>
+      <p:sp>
+        <p:nvSpPr>
+          <p:cNvPr id="69" name="PlaceHolder 3"/>
+          <p:cNvSpPr>
+            <a:spLocks noGrp="1"/>
+          </p:cNvSpPr>
+          <p:nvPr>
+            <p:ph type="body"/>
+          </p:nvPr>
+        </p:nvSpPr>
+        <p:spPr>
+          <a:xfrm>
+            <a:off x="457200" y="1604520"/>
+            <a:ext cx="8229240" cy="3977280"/>
+          </a:xfrm>
+          <a:prstGeom prst="rect">
+            <a:avLst/>
+          </a:prstGeom>
+        </p:spPr>
+        <p:txBody>
+          <a:bodyPr lIns="0" rIns="0" tIns="0" bIns="0"/>
+          <a:p>
+            <a:endParaRPr/>
+          </a:p>
+        </p:txBody>
+      </p:sp>
+      <p:pic>
+        <p:nvPicPr>
+          <p:cNvPr id="70" name="" descr=""/>
+          <p:cNvPicPr/>
+          <p:nvPr/>
+        </p:nvPicPr>
+        <p:blipFill>
+          <a:blip r:embed="rId2"/>
+          <a:stretch>
+            <a:fillRect/>
+          </a:stretch>
+        </p:blipFill>
+        <p:spPr>
+          <a:xfrm>
+            <a:off x="2079000" y="1604520"/>
+            <a:ext cx="4984920" cy="3977280"/>
+          </a:xfrm>
+          <a:prstGeom prst="rect">
+            <a:avLst/>
+          </a:prstGeom>
+          <a:ln>
+            <a:noFill/>
+          </a:ln>
+        </p:spPr>
+      </p:pic>
+      <p:pic>
+        <p:nvPicPr>
+          <p:cNvPr id="71" name="" descr=""/>
+          <p:cNvPicPr/>
+          <p:nvPr/>
+        </p:nvPicPr>
+        <p:blipFill>
+          <a:blip r:embed="rId3"/>
+          <a:stretch>
+            <a:fillRect/>
+          </a:stretch>
+        </p:blipFill>
+        <p:spPr>
+          <a:xfrm>
+            <a:off x="2079000" y="1604520"/>
+            <a:ext cx="4984920" cy="3977280"/>
+          </a:xfrm>
+          <a:prstGeom prst="rect">
+            <a:avLst/>
+          </a:prstGeom>
+          <a:ln>
+            <a:noFill/>
+          </a:ln>
+        </p:spPr>
+      </p:pic>
     </p:spTree>
   </p:cSld>
 </p:sldLayout>
@@ -534,7 +1698,7 @@
       </p:grpSpPr>
       <p:sp>
         <p:nvSpPr>
-          <p:cNvPr id="7" name="PlaceHolder 1"/>
+          <p:cNvPr id="4" name="PlaceHolder 1"/>
           <p:cNvSpPr>
             <a:spLocks noGrp="1"/>
           </p:cNvSpPr>
@@ -545,7 +1709,7 @@
         <p:spPr>
           <a:xfrm>
             <a:off x="685800" y="2130480"/>
-            <a:ext cx="7772040" cy="1469880"/>
+            <a:ext cx="7771680" cy="1469880"/>
           </a:xfrm>
           <a:prstGeom prst="rect">
             <a:avLst/>
@@ -554,13 +1718,14 @@
         <p:txBody>
           <a:bodyPr lIns="0" rIns="0" tIns="0" bIns="0" anchor="ctr"/>
           <a:p>
-            <a:endParaRPr/>
-          </a:p>
-        </p:txBody>
-      </p:sp>
-      <p:sp>
-        <p:nvSpPr>
-          <p:cNvPr id="8" name="PlaceHolder 2"/>
+            <a:pPr algn="ctr"/>
+            <a:endParaRPr/>
+          </a:p>
+        </p:txBody>
+      </p:sp>
+      <p:sp>
+        <p:nvSpPr>
+          <p:cNvPr id="5" name="PlaceHolder 2"/>
           <p:cNvSpPr>
             <a:spLocks noGrp="1"/>
           </p:cNvSpPr>
@@ -608,7 +1773,7 @@
       </p:grpSpPr>
       <p:sp>
         <p:nvSpPr>
-          <p:cNvPr id="9" name="PlaceHolder 1"/>
+          <p:cNvPr id="6" name="PlaceHolder 1"/>
           <p:cNvSpPr>
             <a:spLocks noGrp="1"/>
           </p:cNvSpPr>
@@ -619,7 +1784,7 @@
         <p:spPr>
           <a:xfrm>
             <a:off x="685800" y="2130480"/>
-            <a:ext cx="7772040" cy="1469880"/>
+            <a:ext cx="7771680" cy="1469880"/>
           </a:xfrm>
           <a:prstGeom prst="rect">
             <a:avLst/>
@@ -628,13 +1793,14 @@
         <p:txBody>
           <a:bodyPr lIns="0" rIns="0" tIns="0" bIns="0" anchor="ctr"/>
           <a:p>
-            <a:endParaRPr/>
-          </a:p>
-        </p:txBody>
-      </p:sp>
-      <p:sp>
-        <p:nvSpPr>
-          <p:cNvPr id="10" name="PlaceHolder 2"/>
+            <a:pPr algn="ctr"/>
+            <a:endParaRPr/>
+          </a:p>
+        </p:txBody>
+      </p:sp>
+      <p:sp>
+        <p:nvSpPr>
+          <p:cNvPr id="7" name="PlaceHolder 2"/>
           <p:cNvSpPr>
             <a:spLocks noGrp="1"/>
           </p:cNvSpPr>
@@ -660,7 +1826,7 @@
       </p:sp>
       <p:sp>
         <p:nvSpPr>
-          <p:cNvPr id="11" name="PlaceHolder 3"/>
+          <p:cNvPr id="8" name="PlaceHolder 3"/>
           <p:cNvSpPr>
             <a:spLocks noGrp="1"/>
           </p:cNvSpPr>
@@ -708,7 +1874,7 @@
       </p:grpSpPr>
       <p:sp>
         <p:nvSpPr>
-          <p:cNvPr id="12" name="PlaceHolder 1"/>
+          <p:cNvPr id="9" name="PlaceHolder 1"/>
           <p:cNvSpPr>
             <a:spLocks noGrp="1"/>
           </p:cNvSpPr>
@@ -719,7 +1885,7 @@
         <p:spPr>
           <a:xfrm>
             <a:off x="685800" y="2130480"/>
-            <a:ext cx="7772040" cy="1469880"/>
+            <a:ext cx="7771680" cy="1469880"/>
           </a:xfrm>
           <a:prstGeom prst="rect">
             <a:avLst/>
@@ -728,6 +1894,7 @@
         <p:txBody>
           <a:bodyPr lIns="0" rIns="0" tIns="0" bIns="0" anchor="ctr"/>
           <a:p>
+            <a:pPr algn="ctr"/>
             <a:endParaRPr/>
           </a:p>
         </p:txBody>
@@ -756,7 +1923,7 @@
       </p:grpSpPr>
       <p:sp>
         <p:nvSpPr>
-          <p:cNvPr id="13" name="PlaceHolder 1"/>
+          <p:cNvPr id="10" name="PlaceHolder 1"/>
           <p:cNvSpPr>
             <a:spLocks noGrp="1"/>
           </p:cNvSpPr>
@@ -767,7 +1934,7 @@
         <p:spPr>
           <a:xfrm>
             <a:off x="685800" y="2130480"/>
-            <a:ext cx="7772040" cy="6813360"/>
+            <a:ext cx="7771680" cy="6813360"/>
           </a:xfrm>
           <a:prstGeom prst="rect">
             <a:avLst/>
@@ -805,7 +1972,7 @@
       </p:grpSpPr>
       <p:sp>
         <p:nvSpPr>
-          <p:cNvPr id="14" name="PlaceHolder 1"/>
+          <p:cNvPr id="11" name="PlaceHolder 1"/>
           <p:cNvSpPr>
             <a:spLocks noGrp="1"/>
           </p:cNvSpPr>
@@ -816,7 +1983,7 @@
         <p:spPr>
           <a:xfrm>
             <a:off x="685800" y="2130480"/>
-            <a:ext cx="7772040" cy="1469880"/>
+            <a:ext cx="7771680" cy="1469880"/>
           </a:xfrm>
           <a:prstGeom prst="rect">
             <a:avLst/>
@@ -825,13 +1992,14 @@
         <p:txBody>
           <a:bodyPr lIns="0" rIns="0" tIns="0" bIns="0" anchor="ctr"/>
           <a:p>
-            <a:endParaRPr/>
-          </a:p>
-        </p:txBody>
-      </p:sp>
-      <p:sp>
-        <p:nvSpPr>
-          <p:cNvPr id="15" name="PlaceHolder 2"/>
+            <a:pPr algn="ctr"/>
+            <a:endParaRPr/>
+          </a:p>
+        </p:txBody>
+      </p:sp>
+      <p:sp>
+        <p:nvSpPr>
+          <p:cNvPr id="12" name="PlaceHolder 2"/>
           <p:cNvSpPr>
             <a:spLocks noGrp="1"/>
           </p:cNvSpPr>
@@ -857,7 +2025,7 @@
       </p:sp>
       <p:sp>
         <p:nvSpPr>
-          <p:cNvPr id="16" name="PlaceHolder 3"/>
+          <p:cNvPr id="13" name="PlaceHolder 3"/>
           <p:cNvSpPr>
             <a:spLocks noGrp="1"/>
           </p:cNvSpPr>
@@ -883,7 +2051,7 @@
       </p:sp>
       <p:sp>
         <p:nvSpPr>
-          <p:cNvPr id="17" name="PlaceHolder 4"/>
+          <p:cNvPr id="14" name="PlaceHolder 4"/>
           <p:cNvSpPr>
             <a:spLocks noGrp="1"/>
           </p:cNvSpPr>
@@ -931,7 +2099,7 @@
       </p:grpSpPr>
       <p:sp>
         <p:nvSpPr>
-          <p:cNvPr id="18" name="PlaceHolder 1"/>
+          <p:cNvPr id="15" name="PlaceHolder 1"/>
           <p:cNvSpPr>
             <a:spLocks noGrp="1"/>
           </p:cNvSpPr>
@@ -942,7 +2110,7 @@
         <p:spPr>
           <a:xfrm>
             <a:off x="685800" y="2130480"/>
-            <a:ext cx="7772040" cy="1469880"/>
+            <a:ext cx="7771680" cy="1469880"/>
           </a:xfrm>
           <a:prstGeom prst="rect">
             <a:avLst/>
@@ -951,13 +2119,14 @@
         <p:txBody>
           <a:bodyPr lIns="0" rIns="0" tIns="0" bIns="0" anchor="ctr"/>
           <a:p>
-            <a:endParaRPr/>
-          </a:p>
-        </p:txBody>
-      </p:sp>
-      <p:sp>
-        <p:nvSpPr>
-          <p:cNvPr id="19" name="PlaceHolder 2"/>
+            <a:pPr algn="ctr"/>
+            <a:endParaRPr/>
+          </a:p>
+        </p:txBody>
+      </p:sp>
+      <p:sp>
+        <p:nvSpPr>
+          <p:cNvPr id="16" name="PlaceHolder 2"/>
           <p:cNvSpPr>
             <a:spLocks noGrp="1"/>
           </p:cNvSpPr>
@@ -983,7 +2152,7 @@
       </p:sp>
       <p:sp>
         <p:nvSpPr>
-          <p:cNvPr id="20" name="PlaceHolder 3"/>
+          <p:cNvPr id="17" name="PlaceHolder 3"/>
           <p:cNvSpPr>
             <a:spLocks noGrp="1"/>
           </p:cNvSpPr>
@@ -1009,7 +2178,7 @@
       </p:sp>
       <p:sp>
         <p:nvSpPr>
-          <p:cNvPr id="21" name="PlaceHolder 4"/>
+          <p:cNvPr id="18" name="PlaceHolder 4"/>
           <p:cNvSpPr>
             <a:spLocks noGrp="1"/>
           </p:cNvSpPr>
@@ -1057,7 +2226,7 @@
       </p:grpSpPr>
       <p:sp>
         <p:nvSpPr>
-          <p:cNvPr id="22" name="PlaceHolder 1"/>
+          <p:cNvPr id="19" name="PlaceHolder 1"/>
           <p:cNvSpPr>
             <a:spLocks noGrp="1"/>
           </p:cNvSpPr>
@@ -1068,7 +2237,7 @@
         <p:spPr>
           <a:xfrm>
             <a:off x="685800" y="2130480"/>
-            <a:ext cx="7772040" cy="1469880"/>
+            <a:ext cx="7771680" cy="1469880"/>
           </a:xfrm>
           <a:prstGeom prst="rect">
             <a:avLst/>
@@ -1077,13 +2246,14 @@
         <p:txBody>
           <a:bodyPr lIns="0" rIns="0" tIns="0" bIns="0" anchor="ctr"/>
           <a:p>
-            <a:endParaRPr/>
-          </a:p>
-        </p:txBody>
-      </p:sp>
-      <p:sp>
-        <p:nvSpPr>
-          <p:cNvPr id="23" name="PlaceHolder 2"/>
+            <a:pPr algn="ctr"/>
+            <a:endParaRPr/>
+          </a:p>
+        </p:txBody>
+      </p:sp>
+      <p:sp>
+        <p:nvSpPr>
+          <p:cNvPr id="20" name="PlaceHolder 2"/>
           <p:cNvSpPr>
             <a:spLocks noGrp="1"/>
           </p:cNvSpPr>
@@ -1109,7 +2279,7 @@
       </p:sp>
       <p:sp>
         <p:nvSpPr>
-          <p:cNvPr id="24" name="PlaceHolder 3"/>
+          <p:cNvPr id="21" name="PlaceHolder 3"/>
           <p:cNvSpPr>
             <a:spLocks noGrp="1"/>
           </p:cNvSpPr>
@@ -1135,7 +2305,7 @@
       </p:sp>
       <p:sp>
         <p:nvSpPr>
-          <p:cNvPr id="25" name="PlaceHolder 4"/>
+          <p:cNvPr id="22" name="PlaceHolder 4"/>
           <p:cNvSpPr>
             <a:spLocks noGrp="1"/>
           </p:cNvSpPr>
@@ -1201,28 +2371,20 @@
         <p:spPr>
           <a:xfrm>
             <a:off x="685800" y="2130480"/>
-            <a:ext cx="7772040" cy="1469520"/>
-          </a:xfrm>
-          <a:prstGeom prst="rect">
-            <a:avLst/>
-          </a:prstGeom>
-        </p:spPr>
-        <p:txBody>
-          <a:bodyPr anchor="ctr"/>
-          <a:p>
-            <a:pPr algn="ctr">
-              <a:lnSpc>
-                <a:spcPct val="100000"/>
-              </a:lnSpc>
-            </a:pPr>
-            <a:r>
-              <a:rPr lang="en-US" sz="4400">
-                <a:solidFill>
-                  <a:srgbClr val="000000"/>
-                </a:solidFill>
-                <a:latin typeface="Calibri"/>
-              </a:rPr>
-              <a:t>Click to edit the title text formatClick to edit Master title style</a:t>
+            <a:ext cx="7771680" cy="1469520"/>
+          </a:xfrm>
+          <a:prstGeom prst="rect">
+            <a:avLst/>
+          </a:prstGeom>
+        </p:spPr>
+        <p:txBody>
+          <a:bodyPr lIns="0" rIns="0" tIns="0" bIns="0" anchor="ctr"/>
+          <a:p>
+            <a:r>
+              <a:rPr lang="en-US">
+                <a:latin typeface="Arial"/>
+              </a:rPr>
+              <a:t>Click to edit the title text format</a:t>
             </a:r>
             <a:endParaRPr/>
           </a:p>
@@ -1235,119 +2397,13 @@
             <a:spLocks noGrp="1"/>
           </p:cNvSpPr>
           <p:nvPr>
-            <p:ph type="dt"/>
-          </p:nvPr>
-        </p:nvSpPr>
-        <p:spPr>
-          <a:xfrm>
-            <a:off x="457200" y="6356520"/>
-            <a:ext cx="2133360" cy="364680"/>
-          </a:xfrm>
-          <a:prstGeom prst="rect">
-            <a:avLst/>
-          </a:prstGeom>
-        </p:spPr>
-        <p:txBody>
-          <a:bodyPr anchor="ctr"/>
-          <a:p>
-            <a:pPr>
-              <a:lnSpc>
-                <a:spcPct val="100000"/>
-              </a:lnSpc>
-            </a:pPr>
-            <a:r>
-              <a:rPr lang="en-US" sz="1200">
-                <a:solidFill>
-                  <a:srgbClr val="8b8b8b"/>
-                </a:solidFill>
-                <a:latin typeface="Calibri"/>
-              </a:rPr>
-              <a:t>10/19/14</a:t>
-            </a:r>
-            <a:endParaRPr/>
-          </a:p>
-        </p:txBody>
-      </p:sp>
-      <p:sp>
-        <p:nvSpPr>
-          <p:cNvPr id="2" name="PlaceHolder 3"/>
-          <p:cNvSpPr>
-            <a:spLocks noGrp="1"/>
-          </p:cNvSpPr>
-          <p:nvPr>
-            <p:ph type="ftr"/>
-          </p:nvPr>
-        </p:nvSpPr>
-        <p:spPr>
-          <a:xfrm>
-            <a:off x="3124080" y="6356520"/>
-            <a:ext cx="2895120" cy="364680"/>
-          </a:xfrm>
-          <a:prstGeom prst="rect">
-            <a:avLst/>
-          </a:prstGeom>
-        </p:spPr>
-        <p:txBody>
-          <a:bodyPr anchor="ctr"/>
-          <a:p>
-            <a:endParaRPr/>
-          </a:p>
-        </p:txBody>
-      </p:sp>
-      <p:sp>
-        <p:nvSpPr>
-          <p:cNvPr id="3" name="PlaceHolder 4"/>
-          <p:cNvSpPr>
-            <a:spLocks noGrp="1"/>
-          </p:cNvSpPr>
-          <p:nvPr>
-            <p:ph type="sldNum"/>
-          </p:nvPr>
-        </p:nvSpPr>
-        <p:spPr>
-          <a:xfrm>
-            <a:off x="6553080" y="6356520"/>
-            <a:ext cx="2133360" cy="364680"/>
-          </a:xfrm>
-          <a:prstGeom prst="rect">
-            <a:avLst/>
-          </a:prstGeom>
-        </p:spPr>
-        <p:txBody>
-          <a:bodyPr anchor="ctr"/>
-          <a:p>
-            <a:pPr algn="r">
-              <a:lnSpc>
-                <a:spcPct val="100000"/>
-              </a:lnSpc>
-            </a:pPr>
-            <a:fld id="{AB8AFD7C-F162-483F-976A-20817DD27BEB}" type="slidenum">
-              <a:rPr lang="en-US" sz="1200">
-                <a:solidFill>
-                  <a:srgbClr val="8b8b8b"/>
-                </a:solidFill>
-                <a:latin typeface="Calibri"/>
-              </a:rPr>
-              <a:t>&lt;number&gt;</a:t>
-            </a:fld>
-            <a:endParaRPr/>
-          </a:p>
-        </p:txBody>
-      </p:sp>
-      <p:sp>
-        <p:nvSpPr>
-          <p:cNvPr id="4" name="PlaceHolder 5"/>
-          <p:cNvSpPr>
-            <a:spLocks noGrp="1"/>
-          </p:cNvSpPr>
-          <p:nvPr>
             <p:ph type="body"/>
           </p:nvPr>
         </p:nvSpPr>
         <p:spPr>
           <a:xfrm>
             <a:off x="457200" y="1604520"/>
-            <a:ext cx="8229240" cy="3977280"/>
+            <a:ext cx="8228880" cy="3976920"/>
           </a:xfrm>
           <a:prstGeom prst="rect">
             <a:avLst/>
@@ -1362,8 +2418,8 @@
               <a:buChar char=""/>
             </a:pPr>
             <a:r>
-              <a:rPr lang="en-US" sz="3200">
-                <a:latin typeface="Calibri"/>
+              <a:rPr lang="en-US">
+                <a:latin typeface="Arial"/>
               </a:rPr>
               <a:t>Click to edit the outline text format</a:t>
             </a:r>
@@ -1376,8 +2432,8 @@
               <a:buChar char=""/>
             </a:pPr>
             <a:r>
-              <a:rPr lang="en-US" sz="2400">
-                <a:latin typeface="Calibri"/>
+              <a:rPr lang="en-US">
+                <a:latin typeface="Arial"/>
               </a:rPr>
               <a:t>Second Outline Level</a:t>
             </a:r>
@@ -1390,8 +2446,8 @@
               <a:buChar char=""/>
             </a:pPr>
             <a:r>
-              <a:rPr lang="en-US" sz="2000">
-                <a:latin typeface="Calibri"/>
+              <a:rPr lang="en-US">
+                <a:latin typeface="Arial"/>
               </a:rPr>
               <a:t>Third Outline Level</a:t>
             </a:r>
@@ -1404,8 +2460,8 @@
               <a:buChar char=""/>
             </a:pPr>
             <a:r>
-              <a:rPr lang="en-US" sz="2000">
-                <a:latin typeface="Calibri"/>
+              <a:rPr lang="en-US">
+                <a:latin typeface="Arial"/>
               </a:rPr>
               <a:t>Fourth Outline Level</a:t>
             </a:r>
@@ -1418,8 +2474,8 @@
               <a:buChar char=""/>
             </a:pPr>
             <a:r>
-              <a:rPr lang="en-US" sz="2000">
-                <a:latin typeface="Calibri"/>
+              <a:rPr lang="en-US">
+                <a:latin typeface="Arial"/>
               </a:rPr>
               <a:t>Fifth Outline Level</a:t>
             </a:r>
@@ -1432,8 +2488,8 @@
               <a:buChar char=""/>
             </a:pPr>
             <a:r>
-              <a:rPr lang="en-US" sz="2000">
-                <a:latin typeface="Calibri"/>
+              <a:rPr lang="en-US">
+                <a:latin typeface="Arial"/>
               </a:rPr>
               <a:t>Sixth Outline Level</a:t>
             </a:r>
@@ -1446,8 +2502,8 @@
               <a:buChar char=""/>
             </a:pPr>
             <a:r>
-              <a:rPr lang="en-US" sz="2000">
-                <a:latin typeface="Calibri"/>
+              <a:rPr lang="en-US">
+                <a:latin typeface="Arial"/>
               </a:rPr>
               <a:t>Seventh Outline Level</a:t>
             </a:r>
@@ -1471,6 +2527,203 @@
     <p:sldLayoutId id="2147483658" r:id="rId11"/>
     <p:sldLayoutId id="2147483659" r:id="rId12"/>
     <p:sldLayoutId id="2147483660" r:id="rId13"/>
+  </p:sldLayoutIdLst>
+</p:sldMaster>
+</file>
+
+<file path=ppt/slideMasters/slideMaster2.xml><?xml version="1.0" encoding="utf-8"?>
+<p:sldMaster xmlns:a="http://schemas.openxmlformats.org/drawingml/2006/main" xmlns:p="http://schemas.openxmlformats.org/presentationml/2006/main" xmlns:r="http://schemas.openxmlformats.org/officeDocument/2006/relationships">
+  <p:cSld>
+    <p:bg>
+      <p:bgPr>
+        <a:solidFill>
+          <a:srgbClr val="ffffff"/>
+        </a:solidFill>
+      </p:bgPr>
+    </p:bg>
+    <p:spTree>
+      <p:nvGrpSpPr>
+        <p:cNvPr id="1" name=""/>
+        <p:cNvGrpSpPr/>
+        <p:nvPr/>
+      </p:nvGrpSpPr>
+      <p:grpSpPr>
+        <a:xfrm>
+          <a:off x="0" y="0"/>
+          <a:ext cx="0" cy="0"/>
+          <a:chOff x="0" y="0"/>
+          <a:chExt cx="0" cy="0"/>
+        </a:xfrm>
+      </p:grpSpPr>
+      <p:sp>
+        <p:nvSpPr>
+          <p:cNvPr id="36" name="PlaceHolder 1"/>
+          <p:cNvSpPr>
+            <a:spLocks noGrp="1"/>
+          </p:cNvSpPr>
+          <p:nvPr>
+            <p:ph type="title"/>
+          </p:nvPr>
+        </p:nvSpPr>
+        <p:spPr>
+          <a:xfrm>
+            <a:off x="685800" y="2130480"/>
+            <a:ext cx="7771680" cy="1469520"/>
+          </a:xfrm>
+          <a:prstGeom prst="rect">
+            <a:avLst/>
+          </a:prstGeom>
+        </p:spPr>
+        <p:txBody>
+          <a:bodyPr lIns="0" rIns="0" tIns="0" bIns="0" anchor="ctr"/>
+          <a:p>
+            <a:r>
+              <a:rPr lang="en-US">
+                <a:latin typeface="Arial"/>
+              </a:rPr>
+              <a:t>Click to edit the title text format</a:t>
+            </a:r>
+            <a:endParaRPr/>
+          </a:p>
+        </p:txBody>
+      </p:sp>
+      <p:sp>
+        <p:nvSpPr>
+          <p:cNvPr id="37" name="PlaceHolder 2"/>
+          <p:cNvSpPr>
+            <a:spLocks noGrp="1"/>
+          </p:cNvSpPr>
+          <p:nvPr>
+            <p:ph type="body"/>
+          </p:nvPr>
+        </p:nvSpPr>
+        <p:spPr>
+          <a:xfrm>
+            <a:off x="457200" y="1604520"/>
+            <a:ext cx="8229240" cy="3977280"/>
+          </a:xfrm>
+          <a:prstGeom prst="rect">
+            <a:avLst/>
+          </a:prstGeom>
+        </p:spPr>
+        <p:txBody>
+          <a:bodyPr lIns="0" rIns="0" tIns="0" bIns="0"/>
+          <a:p>
+            <a:pPr>
+              <a:buSzPct val="45000"/>
+              <a:buFont typeface="StarSymbol"/>
+              <a:buChar char=""/>
+            </a:pPr>
+            <a:r>
+              <a:rPr lang="en-US" sz="3200">
+                <a:latin typeface="Arial"/>
+              </a:rPr>
+              <a:t>Click to edit the outline text format</a:t>
+            </a:r>
+            <a:endParaRPr/>
+          </a:p>
+          <a:p>
+            <a:pPr lvl="1">
+              <a:buSzPct val="75000"/>
+              <a:buFont typeface="StarSymbol"/>
+              <a:buChar char=""/>
+            </a:pPr>
+            <a:r>
+              <a:rPr lang="en-US" sz="2800">
+                <a:latin typeface="Arial"/>
+              </a:rPr>
+              <a:t>Second Outline Level</a:t>
+            </a:r>
+            <a:endParaRPr/>
+          </a:p>
+          <a:p>
+            <a:pPr lvl="2">
+              <a:buSzPct val="45000"/>
+              <a:buFont typeface="StarSymbol"/>
+              <a:buChar char=""/>
+            </a:pPr>
+            <a:r>
+              <a:rPr lang="en-US" sz="2400">
+                <a:latin typeface="Arial"/>
+              </a:rPr>
+              <a:t>Third Outline Level</a:t>
+            </a:r>
+            <a:endParaRPr/>
+          </a:p>
+          <a:p>
+            <a:pPr lvl="3">
+              <a:buSzPct val="75000"/>
+              <a:buFont typeface="StarSymbol"/>
+              <a:buChar char=""/>
+            </a:pPr>
+            <a:r>
+              <a:rPr lang="en-US" sz="2000">
+                <a:latin typeface="Arial"/>
+              </a:rPr>
+              <a:t>Fourth Outline Level</a:t>
+            </a:r>
+            <a:endParaRPr/>
+          </a:p>
+          <a:p>
+            <a:pPr lvl="4">
+              <a:buSzPct val="45000"/>
+              <a:buFont typeface="StarSymbol"/>
+              <a:buChar char=""/>
+            </a:pPr>
+            <a:r>
+              <a:rPr lang="en-US" sz="2000">
+                <a:latin typeface="Arial"/>
+              </a:rPr>
+              <a:t>Fifth Outline Level</a:t>
+            </a:r>
+            <a:endParaRPr/>
+          </a:p>
+          <a:p>
+            <a:pPr lvl="5">
+              <a:buSzPct val="45000"/>
+              <a:buFont typeface="StarSymbol"/>
+              <a:buChar char=""/>
+            </a:pPr>
+            <a:r>
+              <a:rPr lang="en-US" sz="2000">
+                <a:latin typeface="Arial"/>
+              </a:rPr>
+              <a:t>Sixth Outline Level</a:t>
+            </a:r>
+            <a:endParaRPr/>
+          </a:p>
+          <a:p>
+            <a:pPr lvl="6">
+              <a:buSzPct val="45000"/>
+              <a:buFont typeface="StarSymbol"/>
+              <a:buChar char=""/>
+            </a:pPr>
+            <a:r>
+              <a:rPr lang="en-US" sz="2000">
+                <a:latin typeface="Arial"/>
+              </a:rPr>
+              <a:t>Seventh Outline Level</a:t>
+            </a:r>
+            <a:endParaRPr/>
+          </a:p>
+        </p:txBody>
+      </p:sp>
+    </p:spTree>
+  </p:cSld>
+  <p:clrMap bg1="lt1" bg2="lt2" tx1="dk1" tx2="dk2" accent1="accent1" accent2="accent2" accent3="accent3" accent4="accent4" accent5="accent5" accent6="accent6" hlink="hlink" folHlink="folHlink"/>
+  <p:sldLayoutIdLst>
+    <p:sldLayoutId id="2147483662" r:id="rId2"/>
+    <p:sldLayoutId id="2147483663" r:id="rId3"/>
+    <p:sldLayoutId id="2147483664" r:id="rId4"/>
+    <p:sldLayoutId id="2147483665" r:id="rId5"/>
+    <p:sldLayoutId id="2147483666" r:id="rId6"/>
+    <p:sldLayoutId id="2147483667" r:id="rId7"/>
+    <p:sldLayoutId id="2147483668" r:id="rId8"/>
+    <p:sldLayoutId id="2147483669" r:id="rId9"/>
+    <p:sldLayoutId id="2147483670" r:id="rId10"/>
+    <p:sldLayoutId id="2147483671" r:id="rId11"/>
+    <p:sldLayoutId id="2147483672" r:id="rId12"/>
+    <p:sldLayoutId id="2147483673" r:id="rId13"/>
   </p:sldLayoutIdLst>
 </p:sldMaster>
 </file>
@@ -1494,18 +2747,22 @@
       </p:grpSpPr>
       <p:sp>
         <p:nvSpPr>
-          <p:cNvPr id="39" name="TextShape 1"/>
-          <p:cNvSpPr txBox="1"/>
+          <p:cNvPr id="72" name="CustomShape 1"/>
+          <p:cNvSpPr/>
           <p:nvPr/>
         </p:nvSpPr>
         <p:spPr>
           <a:xfrm>
             <a:off x="685800" y="2130480"/>
-            <a:ext cx="7772040" cy="1469520"/>
-          </a:xfrm>
-          <a:prstGeom prst="rect">
-            <a:avLst/>
-          </a:prstGeom>
+            <a:ext cx="7771680" cy="1469160"/>
+          </a:xfrm>
+          <a:prstGeom prst="rect">
+            <a:avLst/>
+          </a:prstGeom>
+          <a:noFill/>
+          <a:ln>
+            <a:noFill/>
+          </a:ln>
         </p:spPr>
         <p:txBody>
           <a:bodyPr lIns="0" rIns="0" tIns="0" bIns="0" anchor="ctr"/>
@@ -1522,26 +2779,33 @@
       </p:sp>
       <p:sp>
         <p:nvSpPr>
-          <p:cNvPr id="40" name="TextShape 2"/>
-          <p:cNvSpPr txBox="1"/>
+          <p:cNvPr id="73" name="CustomShape 2"/>
+          <p:cNvSpPr/>
           <p:nvPr/>
         </p:nvSpPr>
         <p:spPr>
           <a:xfrm>
             <a:off x="457200" y="1604520"/>
-            <a:ext cx="8229240" cy="3977280"/>
-          </a:xfrm>
-          <a:prstGeom prst="rect">
-            <a:avLst/>
-          </a:prstGeom>
+            <a:ext cx="8228880" cy="3976920"/>
+          </a:xfrm>
+          <a:prstGeom prst="rect">
+            <a:avLst/>
+          </a:prstGeom>
+          <a:noFill/>
+          <a:ln>
+            <a:noFill/>
+          </a:ln>
         </p:spPr>
         <p:txBody>
           <a:bodyPr lIns="0" rIns="0" tIns="0" bIns="0"/>
           <a:p>
             <a:pPr>
+              <a:lnSpc>
+                <a:spcPct val="100000"/>
+              </a:lnSpc>
               <a:buSzPct val="45000"/>
               <a:buFont typeface="StarSymbol"/>
-              <a:buChar char=""/>
+              <a:buChar char="l"/>
             </a:pPr>
             <a:r>
               <a:rPr lang="en-US" sz="3200">
@@ -1604,26 +2868,33 @@
       </p:grpSpPr>
       <p:sp>
         <p:nvSpPr>
-          <p:cNvPr id="41" name="TextShape 1"/>
-          <p:cNvSpPr txBox="1"/>
+          <p:cNvPr id="74" name="CustomShape 1"/>
+          <p:cNvSpPr/>
           <p:nvPr/>
         </p:nvSpPr>
         <p:spPr>
           <a:xfrm>
             <a:off x="457200" y="1604520"/>
-            <a:ext cx="8229240" cy="3977280"/>
-          </a:xfrm>
-          <a:prstGeom prst="rect">
-            <a:avLst/>
-          </a:prstGeom>
+            <a:ext cx="8228880" cy="3976920"/>
+          </a:xfrm>
+          <a:prstGeom prst="rect">
+            <a:avLst/>
+          </a:prstGeom>
+          <a:noFill/>
+          <a:ln>
+            <a:noFill/>
+          </a:ln>
         </p:spPr>
         <p:txBody>
           <a:bodyPr lIns="0" rIns="0" tIns="0" bIns="0"/>
           <a:p>
             <a:pPr>
+              <a:lnSpc>
+                <a:spcPct val="100000"/>
+              </a:lnSpc>
               <a:buSzPct val="45000"/>
               <a:buFont typeface="StarSymbol"/>
-              <a:buChar char=""/>
+              <a:buChar char="l"/>
             </a:pPr>
             <a:r>
               <a:rPr lang="en-US" sz="3200">
@@ -1637,18 +2908,22 @@
       </p:sp>
       <p:sp>
         <p:nvSpPr>
-          <p:cNvPr id="42" name="TextShape 2"/>
-          <p:cNvSpPr txBox="1"/>
+          <p:cNvPr id="75" name="CustomShape 2"/>
+          <p:cNvSpPr/>
           <p:nvPr/>
         </p:nvSpPr>
         <p:spPr>
           <a:xfrm>
             <a:off x="731520" y="2194560"/>
-            <a:ext cx="7772040" cy="4845960"/>
-          </a:xfrm>
-          <a:prstGeom prst="rect">
-            <a:avLst/>
-          </a:prstGeom>
+            <a:ext cx="7771680" cy="4845600"/>
+          </a:xfrm>
+          <a:prstGeom prst="rect">
+            <a:avLst/>
+          </a:prstGeom>
+          <a:noFill/>
+          <a:ln>
+            <a:noFill/>
+          </a:ln>
         </p:spPr>
         <p:txBody>
           <a:bodyPr lIns="0" rIns="0" tIns="0" bIns="0" anchor="ctr"/>
@@ -1659,107 +2934,63 @@
               </a:rPr>
               <a:t>Empowering pateint and access to support</a:t>
             </a:r>
+            <a:endParaRPr/>
+          </a:p>
+          <a:p>
+            <a:endParaRPr/>
+          </a:p>
+          <a:p>
             <a:r>
               <a:rPr lang="en-US">
                 <a:latin typeface="Calibri"/>
               </a:rPr>
-              <a:t>
-</a:t>
+              <a:t>21</a:t>
+            </a:r>
+            <a:r>
+              <a:rPr lang="en-US" baseline="101000">
+                <a:latin typeface="Calibri"/>
+              </a:rPr>
+              <a:t>st</a:t>
             </a:r>
             <a:r>
               <a:rPr lang="en-US">
                 <a:latin typeface="Calibri"/>
               </a:rPr>
-              <a:t>
-</a:t>
-            </a:r>
+              <a:t> century interactions with GP</a:t>
+            </a:r>
+            <a:endParaRPr/>
+          </a:p>
+          <a:p>
+            <a:endParaRPr/>
+          </a:p>
+          <a:p>
             <a:r>
               <a:rPr lang="en-US">
                 <a:latin typeface="Calibri"/>
               </a:rPr>
-              <a:t>21</a:t>
-            </a:r>
-            <a:r>
-              <a:rPr lang="en-US" baseline="101000">
-                <a:latin typeface="Calibri"/>
-              </a:rPr>
-              <a:t>st</a:t>
-            </a:r>
-            <a:r>
-              <a:rPr lang="en-US">
-                <a:latin typeface="Calibri"/>
-              </a:rPr>
-              <a:t> century interactions with GP</a:t>
-            </a:r>
-            <a:r>
-              <a:rPr lang="en-US">
-                <a:latin typeface="Calibri"/>
-              </a:rPr>
-              <a:t>
-</a:t>
-            </a:r>
-            <a:r>
-              <a:rPr lang="en-US">
-                <a:latin typeface="Calibri"/>
-              </a:rPr>
-              <a:t>
-</a:t>
-            </a:r>
-            <a:r>
-              <a:rPr lang="en-US">
-                <a:latin typeface="Calibri"/>
-              </a:rPr>
               <a:t>Interactive Profile</a:t>
             </a:r>
-            <a:r>
-              <a:rPr lang="en-US">
-                <a:latin typeface="Calibri"/>
-              </a:rPr>
-              <a:t>
-</a:t>
-            </a:r>
-            <a:r>
-              <a:rPr lang="en-US">
-                <a:latin typeface="Calibri"/>
-              </a:rPr>
-              <a:t>
-</a:t>
-            </a:r>
-            <a:r>
-              <a:rPr lang="en-US">
-                <a:latin typeface="Calibri"/>
-              </a:rPr>
-              <a:t>
-</a:t>
-            </a:r>
-            <a:r>
-              <a:rPr lang="en-US">
-                <a:latin typeface="Calibri"/>
-              </a:rPr>
-              <a:t>
-</a:t>
-            </a:r>
-            <a:r>
-              <a:rPr lang="en-US">
-                <a:latin typeface="Calibri"/>
-              </a:rPr>
-              <a:t>
-</a:t>
-            </a:r>
-            <a:r>
-              <a:rPr lang="en-US">
-                <a:latin typeface="Calibri"/>
-              </a:rPr>
-              <a:t>
-</a:t>
-            </a:r>
-            <a:r>
-              <a:rPr lang="en-US">
-                <a:latin typeface="Calibri"/>
-              </a:rPr>
-              <a:t>
-</a:t>
-            </a:r>
+            <a:endParaRPr/>
+          </a:p>
+          <a:p>
+            <a:endParaRPr/>
+          </a:p>
+          <a:p>
+            <a:endParaRPr/>
+          </a:p>
+          <a:p>
+            <a:endParaRPr/>
+          </a:p>
+          <a:p>
+            <a:endParaRPr/>
+          </a:p>
+          <a:p>
+            <a:endParaRPr/>
+          </a:p>
+          <a:p>
+            <a:endParaRPr/>
+          </a:p>
+          <a:p>
             <a:endParaRPr/>
           </a:p>
         </p:txBody>
@@ -1815,18 +3046,22 @@
       </p:grpSpPr>
       <p:sp>
         <p:nvSpPr>
-          <p:cNvPr id="43" name="TextShape 1"/>
-          <p:cNvSpPr txBox="1"/>
+          <p:cNvPr id="76" name="CustomShape 1"/>
+          <p:cNvSpPr/>
           <p:nvPr/>
         </p:nvSpPr>
         <p:spPr>
           <a:xfrm>
             <a:off x="685800" y="2804040"/>
-            <a:ext cx="7772040" cy="2414160"/>
-          </a:xfrm>
-          <a:prstGeom prst="rect">
-            <a:avLst/>
-          </a:prstGeom>
+            <a:ext cx="7771680" cy="2413800"/>
+          </a:xfrm>
+          <a:prstGeom prst="rect">
+            <a:avLst/>
+          </a:prstGeom>
+          <a:noFill/>
+          <a:ln>
+            <a:noFill/>
+          </a:ln>
         </p:spPr>
         <p:txBody>
           <a:bodyPr lIns="0" rIns="0" tIns="0" bIns="0" anchor="ctr"/>
@@ -1849,44 +3084,28 @@
               </a:rPr>
               <a:t>Specific example:Bowel Cancer  </a:t>
             </a:r>
+            <a:endParaRPr/>
+          </a:p>
+          <a:p>
+            <a:endParaRPr/>
+          </a:p>
+          <a:p>
             <a:r>
               <a:rPr lang="en-US">
                 <a:latin typeface="Calibri"/>
               </a:rPr>
-              <a:t>
-</a:t>
-            </a:r>
+              <a:t>Explore: pharmacist, community support</a:t>
+            </a:r>
+            <a:endParaRPr/>
+          </a:p>
+          <a:p>
+            <a:endParaRPr/>
+          </a:p>
+          <a:p>
             <a:r>
               <a:rPr lang="en-US">
                 <a:latin typeface="Calibri"/>
               </a:rPr>
-              <a:t>
-</a:t>
-            </a:r>
-            <a:r>
-              <a:rPr lang="en-US">
-                <a:latin typeface="Calibri"/>
-              </a:rPr>
-              <a:t>Explore: pharmacist, community support</a:t>
-            </a:r>
-            <a:r>
-              <a:rPr lang="en-US">
-                <a:latin typeface="Calibri"/>
-              </a:rPr>
-              <a:t>
-</a:t>
-            </a:r>
-            <a:r>
-              <a:rPr lang="en-US">
-                <a:latin typeface="Calibri"/>
-              </a:rPr>
-              <a:t>
-</a:t>
-            </a:r>
-            <a:r>
-              <a:rPr lang="en-US">
-                <a:latin typeface="Calibri"/>
-              </a:rPr>
               <a:t>Lots more</a:t>
             </a:r>
             <a:endParaRPr/>
@@ -1901,26 +3120,33 @@
       </p:sp>
       <p:sp>
         <p:nvSpPr>
-          <p:cNvPr id="44" name="TextShape 2"/>
-          <p:cNvSpPr txBox="1"/>
+          <p:cNvPr id="77" name="CustomShape 2"/>
+          <p:cNvSpPr/>
           <p:nvPr/>
         </p:nvSpPr>
         <p:spPr>
           <a:xfrm>
             <a:off x="457200" y="1604520"/>
-            <a:ext cx="8229240" cy="3977280"/>
-          </a:xfrm>
-          <a:prstGeom prst="rect">
-            <a:avLst/>
-          </a:prstGeom>
+            <a:ext cx="8228880" cy="3976920"/>
+          </a:xfrm>
+          <a:prstGeom prst="rect">
+            <a:avLst/>
+          </a:prstGeom>
+          <a:noFill/>
+          <a:ln>
+            <a:noFill/>
+          </a:ln>
         </p:spPr>
         <p:txBody>
           <a:bodyPr lIns="0" rIns="0" tIns="0" bIns="0"/>
           <a:p>
             <a:pPr>
+              <a:lnSpc>
+                <a:spcPct val="100000"/>
+              </a:lnSpc>
               <a:buSzPct val="45000"/>
               <a:buFont typeface="StarSymbol"/>
-              <a:buChar char=""/>
+              <a:buChar char="l"/>
             </a:pPr>
             <a:r>
               <a:rPr lang="en-US" sz="3200">
@@ -1983,18 +3209,22 @@
       </p:grpSpPr>
       <p:sp>
         <p:nvSpPr>
-          <p:cNvPr id="45" name="TextShape 1"/>
-          <p:cNvSpPr txBox="1"/>
+          <p:cNvPr id="78" name="CustomShape 1"/>
+          <p:cNvSpPr/>
           <p:nvPr/>
         </p:nvSpPr>
         <p:spPr>
           <a:xfrm>
             <a:off x="640440" y="2553840"/>
-            <a:ext cx="7772040" cy="1469520"/>
-          </a:xfrm>
-          <a:prstGeom prst="rect">
-            <a:avLst/>
-          </a:prstGeom>
+            <a:ext cx="7771680" cy="1469160"/>
+          </a:xfrm>
+          <a:prstGeom prst="rect">
+            <a:avLst/>
+          </a:prstGeom>
+          <a:noFill/>
+          <a:ln>
+            <a:noFill/>
+          </a:ln>
         </p:spPr>
         <p:txBody>
           <a:bodyPr lIns="0" rIns="0" tIns="0" bIns="0" anchor="ctr"/>
@@ -2005,44 +3235,28 @@
               </a:rPr>
               <a:t>Control</a:t>
             </a:r>
+            <a:endParaRPr/>
+          </a:p>
+          <a:p>
+            <a:endParaRPr/>
+          </a:p>
+          <a:p>
             <a:r>
               <a:rPr lang="en-US">
                 <a:latin typeface="Calibri"/>
               </a:rPr>
-              <a:t>
-</a:t>
-            </a:r>
+              <a:t>Time </a:t>
+            </a:r>
+            <a:endParaRPr/>
+          </a:p>
+          <a:p>
+            <a:endParaRPr/>
+          </a:p>
+          <a:p>
             <a:r>
               <a:rPr lang="en-US">
                 <a:latin typeface="Calibri"/>
               </a:rPr>
-              <a:t>
-</a:t>
-            </a:r>
-            <a:r>
-              <a:rPr lang="en-US">
-                <a:latin typeface="Calibri"/>
-              </a:rPr>
-              <a:t>Time </a:t>
-            </a:r>
-            <a:r>
-              <a:rPr lang="en-US">
-                <a:latin typeface="Calibri"/>
-              </a:rPr>
-              <a:t>
-</a:t>
-            </a:r>
-            <a:r>
-              <a:rPr lang="en-US">
-                <a:latin typeface="Calibri"/>
-              </a:rPr>
-              <a:t>
-</a:t>
-            </a:r>
-            <a:r>
-              <a:rPr lang="en-US">
-                <a:latin typeface="Calibri"/>
-              </a:rPr>
               <a:t>Technology</a:t>
             </a:r>
             <a:endParaRPr/>
@@ -2051,26 +3265,33 @@
       </p:sp>
       <p:sp>
         <p:nvSpPr>
-          <p:cNvPr id="46" name="TextShape 2"/>
-          <p:cNvSpPr txBox="1"/>
+          <p:cNvPr id="79" name="CustomShape 2"/>
+          <p:cNvSpPr/>
           <p:nvPr/>
         </p:nvSpPr>
         <p:spPr>
           <a:xfrm>
             <a:off x="457200" y="1604520"/>
-            <a:ext cx="8229240" cy="3977280"/>
-          </a:xfrm>
-          <a:prstGeom prst="rect">
-            <a:avLst/>
-          </a:prstGeom>
+            <a:ext cx="8228880" cy="3976920"/>
+          </a:xfrm>
+          <a:prstGeom prst="rect">
+            <a:avLst/>
+          </a:prstGeom>
+          <a:noFill/>
+          <a:ln>
+            <a:noFill/>
+          </a:ln>
         </p:spPr>
         <p:txBody>
           <a:bodyPr lIns="0" rIns="0" tIns="0" bIns="0"/>
           <a:p>
             <a:pPr>
+              <a:lnSpc>
+                <a:spcPct val="100000"/>
+              </a:lnSpc>
               <a:buSzPct val="45000"/>
               <a:buFont typeface="StarSymbol"/>
-              <a:buChar char=""/>
+              <a:buChar char="l"/>
             </a:pPr>
             <a:r>
               <a:rPr lang="en-US" sz="3200">
@@ -2133,14 +3354,14 @@
       </p:grpSpPr>
       <p:sp>
         <p:nvSpPr>
-          <p:cNvPr id="47" name="CustomShape 1"/>
+          <p:cNvPr id="80" name="CustomShape 1"/>
           <p:cNvSpPr/>
           <p:nvPr/>
         </p:nvSpPr>
         <p:spPr>
           <a:xfrm>
             <a:off x="15840" y="113760"/>
-            <a:ext cx="3147480" cy="599400"/>
+            <a:ext cx="3147120" cy="599040"/>
           </a:xfrm>
           <a:prstGeom prst="roundRect">
             <a:avLst>
@@ -2180,14 +3401,14 @@
       </p:sp>
       <p:sp>
         <p:nvSpPr>
-          <p:cNvPr id="48" name="CustomShape 2"/>
+          <p:cNvPr id="81" name="CustomShape 2"/>
           <p:cNvSpPr/>
           <p:nvPr/>
         </p:nvSpPr>
         <p:spPr>
           <a:xfrm>
             <a:off x="15840" y="785160"/>
-            <a:ext cx="3147480" cy="599400"/>
+            <a:ext cx="3147120" cy="599040"/>
           </a:xfrm>
           <a:prstGeom prst="roundRect">
             <a:avLst>
@@ -2227,14 +3448,14 @@
       </p:sp>
       <p:sp>
         <p:nvSpPr>
-          <p:cNvPr id="49" name="CustomShape 3"/>
+          <p:cNvPr id="82" name="CustomShape 3"/>
           <p:cNvSpPr/>
           <p:nvPr/>
         </p:nvSpPr>
         <p:spPr>
           <a:xfrm>
             <a:off x="15840" y="1456920"/>
-            <a:ext cx="3147480" cy="599400"/>
+            <a:ext cx="3147120" cy="599040"/>
           </a:xfrm>
           <a:prstGeom prst="roundRect">
             <a:avLst>
@@ -2274,14 +3495,14 @@
       </p:sp>
       <p:sp>
         <p:nvSpPr>
-          <p:cNvPr id="50" name="CustomShape 4"/>
+          <p:cNvPr id="83" name="CustomShape 4"/>
           <p:cNvSpPr/>
           <p:nvPr/>
         </p:nvSpPr>
         <p:spPr>
           <a:xfrm>
             <a:off x="15840" y="2128320"/>
-            <a:ext cx="3147480" cy="599400"/>
+            <a:ext cx="3147120" cy="599040"/>
           </a:xfrm>
           <a:prstGeom prst="roundRect">
             <a:avLst>
@@ -2321,14 +3542,14 @@
       </p:sp>
       <p:sp>
         <p:nvSpPr>
-          <p:cNvPr id="51" name="CustomShape 5"/>
+          <p:cNvPr id="84" name="CustomShape 5"/>
           <p:cNvSpPr/>
           <p:nvPr/>
         </p:nvSpPr>
         <p:spPr>
           <a:xfrm>
             <a:off x="15840" y="2800080"/>
-            <a:ext cx="3147480" cy="599400"/>
+            <a:ext cx="3147120" cy="599040"/>
           </a:xfrm>
           <a:prstGeom prst="roundRect">
             <a:avLst>
@@ -2368,14 +3589,14 @@
       </p:sp>
       <p:sp>
         <p:nvSpPr>
-          <p:cNvPr id="52" name="CustomShape 6"/>
+          <p:cNvPr id="85" name="CustomShape 6"/>
           <p:cNvSpPr/>
           <p:nvPr/>
         </p:nvSpPr>
         <p:spPr>
           <a:xfrm>
             <a:off x="15840" y="3471840"/>
-            <a:ext cx="3147480" cy="599400"/>
+            <a:ext cx="3147120" cy="599040"/>
           </a:xfrm>
           <a:prstGeom prst="roundRect">
             <a:avLst>
@@ -2415,14 +3636,14 @@
       </p:sp>
       <p:sp>
         <p:nvSpPr>
-          <p:cNvPr id="53" name="CustomShape 7"/>
+          <p:cNvPr id="86" name="CustomShape 7"/>
           <p:cNvSpPr/>
           <p:nvPr/>
         </p:nvSpPr>
         <p:spPr>
           <a:xfrm>
             <a:off x="15840" y="4143240"/>
-            <a:ext cx="3147480" cy="599400"/>
+            <a:ext cx="3147120" cy="599040"/>
           </a:xfrm>
           <a:prstGeom prst="roundRect">
             <a:avLst>
@@ -2462,14 +3683,14 @@
       </p:sp>
       <p:sp>
         <p:nvSpPr>
-          <p:cNvPr id="54" name="CustomShape 8"/>
+          <p:cNvPr id="87" name="CustomShape 8"/>
           <p:cNvSpPr/>
           <p:nvPr/>
         </p:nvSpPr>
         <p:spPr>
           <a:xfrm>
             <a:off x="15840" y="4815000"/>
-            <a:ext cx="3147480" cy="599400"/>
+            <a:ext cx="3147120" cy="599040"/>
           </a:xfrm>
           <a:prstGeom prst="roundRect">
             <a:avLst>
@@ -2509,14 +3730,14 @@
       </p:sp>
       <p:sp>
         <p:nvSpPr>
-          <p:cNvPr id="55" name="CustomShape 9"/>
+          <p:cNvPr id="88" name="CustomShape 9"/>
           <p:cNvSpPr/>
           <p:nvPr/>
         </p:nvSpPr>
         <p:spPr>
           <a:xfrm>
             <a:off x="15840" y="5486760"/>
-            <a:ext cx="3147480" cy="599400"/>
+            <a:ext cx="3147120" cy="599040"/>
           </a:xfrm>
           <a:prstGeom prst="roundRect">
             <a:avLst>
@@ -2556,14 +3777,14 @@
       </p:sp>
       <p:sp>
         <p:nvSpPr>
-          <p:cNvPr id="56" name="CustomShape 10"/>
+          <p:cNvPr id="89" name="CustomShape 10"/>
           <p:cNvSpPr/>
           <p:nvPr/>
         </p:nvSpPr>
         <p:spPr>
           <a:xfrm>
             <a:off x="15840" y="6158160"/>
-            <a:ext cx="3147480" cy="599400"/>
+            <a:ext cx="3147120" cy="599040"/>
           </a:xfrm>
           <a:prstGeom prst="roundRect">
             <a:avLst>
@@ -2603,14 +3824,14 @@
       </p:sp>
       <p:sp>
         <p:nvSpPr>
-          <p:cNvPr id="57" name="CustomShape 11"/>
+          <p:cNvPr id="90" name="CustomShape 11"/>
           <p:cNvSpPr/>
           <p:nvPr/>
         </p:nvSpPr>
         <p:spPr>
           <a:xfrm>
             <a:off x="6003000" y="34560"/>
-            <a:ext cx="3147480" cy="914760"/>
+            <a:ext cx="3147120" cy="914400"/>
           </a:xfrm>
           <a:prstGeom prst="roundRect">
             <a:avLst>
@@ -2650,14 +3871,14 @@
       </p:sp>
       <p:sp>
         <p:nvSpPr>
-          <p:cNvPr id="58" name="CustomShape 12"/>
+          <p:cNvPr id="91" name="CustomShape 12"/>
           <p:cNvSpPr/>
           <p:nvPr/>
         </p:nvSpPr>
         <p:spPr>
           <a:xfrm>
             <a:off x="6003000" y="1015920"/>
-            <a:ext cx="3147480" cy="914760"/>
+            <a:ext cx="3147120" cy="914400"/>
           </a:xfrm>
           <a:prstGeom prst="roundRect">
             <a:avLst>
@@ -2697,14 +3918,14 @@
       </p:sp>
       <p:sp>
         <p:nvSpPr>
-          <p:cNvPr id="59" name="CustomShape 13"/>
+          <p:cNvPr id="92" name="CustomShape 13"/>
           <p:cNvSpPr/>
           <p:nvPr/>
         </p:nvSpPr>
         <p:spPr>
           <a:xfrm>
             <a:off x="6003000" y="1996920"/>
-            <a:ext cx="3147480" cy="914760"/>
+            <a:ext cx="3147120" cy="914400"/>
           </a:xfrm>
           <a:prstGeom prst="roundRect">
             <a:avLst>
@@ -2744,14 +3965,14 @@
       </p:sp>
       <p:sp>
         <p:nvSpPr>
-          <p:cNvPr id="60" name="CustomShape 14"/>
+          <p:cNvPr id="93" name="CustomShape 14"/>
           <p:cNvSpPr/>
           <p:nvPr/>
         </p:nvSpPr>
         <p:spPr>
           <a:xfrm>
             <a:off x="6003000" y="2978280"/>
-            <a:ext cx="3147480" cy="914760"/>
+            <a:ext cx="3147120" cy="914400"/>
           </a:xfrm>
           <a:prstGeom prst="roundRect">
             <a:avLst>
@@ -2791,14 +4012,14 @@
       </p:sp>
       <p:sp>
         <p:nvSpPr>
-          <p:cNvPr id="61" name="CustomShape 15"/>
+          <p:cNvPr id="94" name="CustomShape 15"/>
           <p:cNvSpPr/>
           <p:nvPr/>
         </p:nvSpPr>
         <p:spPr>
           <a:xfrm>
             <a:off x="6003000" y="3959280"/>
-            <a:ext cx="3147480" cy="914760"/>
+            <a:ext cx="3147120" cy="914400"/>
           </a:xfrm>
           <a:prstGeom prst="roundRect">
             <a:avLst>
@@ -2838,14 +4059,14 @@
       </p:sp>
       <p:sp>
         <p:nvSpPr>
-          <p:cNvPr id="62" name="CustomShape 16"/>
+          <p:cNvPr id="95" name="CustomShape 16"/>
           <p:cNvSpPr/>
           <p:nvPr/>
         </p:nvSpPr>
         <p:spPr>
           <a:xfrm>
             <a:off x="6003000" y="4940640"/>
-            <a:ext cx="3147480" cy="914760"/>
+            <a:ext cx="3147120" cy="914400"/>
           </a:xfrm>
           <a:prstGeom prst="roundRect">
             <a:avLst>
@@ -2885,14 +4106,14 @@
       </p:sp>
       <p:sp>
         <p:nvSpPr>
-          <p:cNvPr id="63" name="CustomShape 17"/>
+          <p:cNvPr id="96" name="CustomShape 17"/>
           <p:cNvSpPr/>
           <p:nvPr/>
         </p:nvSpPr>
         <p:spPr>
           <a:xfrm>
             <a:off x="6003000" y="5921640"/>
-            <a:ext cx="3147480" cy="914760"/>
+            <a:ext cx="3147120" cy="914400"/>
           </a:xfrm>
           <a:prstGeom prst="roundRect">
             <a:avLst>
@@ -2931,6 +4152,163 @@
           <p:childTnLst>
             <p:seq>
               <p:cTn id="10" nodeType="mainSeq"/>
+              <p:prevCondLst>
+                <p:cond delay="0" evt="onPrev">
+                  <p:tgtEl>
+                    <p:sldTgt/>
+                  </p:tgtEl>
+                </p:cond>
+              </p:prevCondLst>
+              <p:nextCondLst>
+                <p:cond delay="0" evt="onNext">
+                  <p:tgtEl>
+                    <p:sldTgt/>
+                  </p:tgtEl>
+                </p:cond>
+              </p:nextCondLst>
+            </p:seq>
+          </p:childTnLst>
+        </p:cTn>
+      </p:par>
+    </p:tnLst>
+  </p:timing>
+</p:sld>
+</file>
+
+<file path=ppt/slides/slide6.xml><?xml version="1.0" encoding="utf-8"?>
+<p:sld xmlns:a="http://schemas.openxmlformats.org/drawingml/2006/main" xmlns:p="http://schemas.openxmlformats.org/presentationml/2006/main" xmlns:r="http://schemas.openxmlformats.org/officeDocument/2006/relationships">
+  <p:cSld>
+    <p:spTree>
+      <p:nvGrpSpPr>
+        <p:cNvPr id="1" name=""/>
+        <p:cNvGrpSpPr/>
+        <p:nvPr/>
+      </p:nvGrpSpPr>
+      <p:grpSpPr>
+        <a:xfrm>
+          <a:off x="0" y="0"/>
+          <a:ext cx="0" cy="0"/>
+          <a:chOff x="0" y="0"/>
+          <a:chExt cx="0" cy="0"/>
+        </a:xfrm>
+      </p:grpSpPr>
+      <p:sp>
+        <p:nvSpPr>
+          <p:cNvPr id="97" name="TextShape 1"/>
+          <p:cNvSpPr txBox="1"/>
+          <p:nvPr/>
+        </p:nvSpPr>
+        <p:spPr>
+          <a:xfrm>
+            <a:off x="731520" y="2194560"/>
+            <a:ext cx="7771680" cy="4605840"/>
+          </a:xfrm>
+          <a:prstGeom prst="rect">
+            <a:avLst/>
+          </a:prstGeom>
+        </p:spPr>
+        <p:txBody>
+          <a:bodyPr lIns="0" rIns="0" tIns="0" bIns="0" anchor="ctr"/>
+          <a:p>
+            <a:r>
+              <a:rPr lang="en-US" sz="4000">
+                <a:latin typeface="Arial"/>
+              </a:rPr>
+              <a:t>Control – shift to individual mostly</a:t>
+            </a:r>
+            <a:r>
+              <a:rPr lang="en-US" sz="4000">
+                <a:latin typeface="Arial"/>
+              </a:rPr>
+              <a:t>
+</a:t>
+            </a:r>
+            <a:r>
+              <a:rPr lang="en-US" sz="4000">
+                <a:latin typeface="Arial"/>
+              </a:rPr>
+              <a:t>
+</a:t>
+            </a:r>
+            <a:r>
+              <a:rPr lang="en-US" sz="4000">
+                <a:latin typeface="Arial"/>
+              </a:rPr>
+              <a:t>Time – A lot shorter</a:t>
+            </a:r>
+            <a:r>
+              <a:rPr lang="en-US" sz="4000">
+                <a:latin typeface="Arial"/>
+              </a:rPr>
+              <a:t>
+</a:t>
+            </a:r>
+            <a:r>
+              <a:rPr lang="en-US" sz="4000">
+                <a:latin typeface="Arial"/>
+              </a:rPr>
+              <a:t>
+</a:t>
+            </a:r>
+            <a:r>
+              <a:rPr lang="en-US" sz="4000">
+                <a:latin typeface="Arial"/>
+              </a:rPr>
+              <a:t>Computer/machines – shift from administrative use to diagnostics or even robotic surgery</a:t>
+            </a:r>
+            <a:r>
+              <a:rPr lang="en-US" sz="4400">
+                <a:latin typeface="Arial"/>
+              </a:rPr>
+              <a:t>
+</a:t>
+            </a:r>
+            <a:endParaRPr/>
+          </a:p>
+        </p:txBody>
+      </p:sp>
+      <p:sp>
+        <p:nvSpPr>
+          <p:cNvPr id="98" name="TextShape 2"/>
+          <p:cNvSpPr txBox="1"/>
+          <p:nvPr/>
+        </p:nvSpPr>
+        <p:spPr>
+          <a:xfrm>
+            <a:off x="457200" y="1604520"/>
+            <a:ext cx="8229240" cy="3977280"/>
+          </a:xfrm>
+          <a:prstGeom prst="rect">
+            <a:avLst/>
+          </a:prstGeom>
+        </p:spPr>
+        <p:txBody>
+          <a:bodyPr lIns="0" rIns="0" tIns="0" bIns="0"/>
+          <a:p>
+            <a:pPr>
+              <a:buSzPct val="45000"/>
+              <a:buFont typeface="StarSymbol"/>
+              <a:buChar char=""/>
+            </a:pPr>
+            <a:r>
+              <a:rPr lang="en-US" sz="3200">
+                <a:latin typeface="Arial"/>
+              </a:rPr>
+              <a:t>Conclusions</a:t>
+            </a:r>
+            <a:endParaRPr/>
+          </a:p>
+        </p:txBody>
+      </p:sp>
+    </p:spTree>
+  </p:cSld>
+  <p:timing>
+    <p:tnLst>
+      <p:par>
+        <p:cTn id="11" dur="indefinite" restart="never" nodeType="tmRoot">
+          <p:childTnLst>
+            <p:seq>
+              <p:cTn id="12" nodeType="mainSeq"/>
               <p:prevCondLst>
                 <p:cond delay="0" evt="onPrev">
                   <p:tgtEl>
@@ -3175,4 +4553,227 @@
     </a:fmtScheme>
   </a:themeElements>
 </a:theme>
+</file>
+
+<file path=ppt/theme/theme2.xml><?xml version="1.0" encoding="utf-8"?>
+<a:theme xmlns:a="http://schemas.openxmlformats.org/drawingml/2006/main" name="Office Theme">
+  <a:themeElements>
+    <a:clrScheme name="Office">
+      <a:dk1>
+        <a:sysClr val="windowText" lastClr="000000"/>
+      </a:dk1>
+      <a:lt1>
+        <a:sysClr val="window" lastClr="FFFFFF"/>
+      </a:lt1>
+      <a:dk2>
+        <a:srgbClr val="1F497D"/>
+      </a:dk2>
+      <a:lt2>
+        <a:srgbClr val="EEECE1"/>
+      </a:lt2>
+      <a:accent1>
+        <a:srgbClr val="4F81BD"/>
+      </a:accent1>
+      <a:accent2>
+        <a:srgbClr val="C0504D"/>
+      </a:accent2>
+      <a:accent3>
+        <a:srgbClr val="9BBB59"/>
+      </a:accent3>
+      <a:accent4>
+        <a:srgbClr val="8064A2"/>
+      </a:accent4>
+      <a:accent5>
+        <a:srgbClr val="4BACC6"/>
+      </a:accent5>
+      <a:accent6>
+        <a:srgbClr val="F79646"/>
+      </a:accent6>
+      <a:hlink>
+        <a:srgbClr val="0000FF"/>
+      </a:hlink>
+      <a:folHlink>
+        <a:srgbClr val="800080"/>
+      </a:folHlink>
+    </a:clrScheme>
+    <a:fontScheme name="Office">
+      <a:majorFont>
+        <a:latin typeface="Arial"/>
+        <a:ea typeface="DejaVu Sans"/>
+        <a:cs typeface="DejaVu Sans"/>
+      </a:majorFont>
+      <a:minorFont>
+        <a:latin typeface="Arial"/>
+        <a:ea typeface="DejaVu Sans"/>
+        <a:cs typeface="DejaVu Sans"/>
+      </a:minorFont>
+    </a:fontScheme>
+    <a:fmtScheme name="Office">
+      <a:fillStyleLst>
+        <a:solidFill>
+          <a:schemeClr val="phClr"/>
+        </a:solidFill>
+        <a:gradFill rotWithShape="1">
+          <a:gsLst>
+            <a:gs pos="0">
+              <a:schemeClr val="phClr">
+                <a:tint val="50000"/>
+                <a:satMod val="300000"/>
+              </a:schemeClr>
+            </a:gs>
+            <a:gs pos="35000">
+              <a:schemeClr val="phClr">
+                <a:tint val="37000"/>
+                <a:satMod val="300000"/>
+              </a:schemeClr>
+            </a:gs>
+            <a:gs pos="100000">
+              <a:schemeClr val="phClr">
+                <a:tint val="15000"/>
+                <a:satMod val="350000"/>
+              </a:schemeClr>
+            </a:gs>
+          </a:gsLst>
+          <a:lin ang="16200000" scaled="1"/>
+        </a:gradFill>
+        <a:gradFill rotWithShape="1">
+          <a:gsLst>
+            <a:gs pos="0">
+              <a:schemeClr val="phClr">
+                <a:shade val="51000"/>
+                <a:satMod val="130000"/>
+              </a:schemeClr>
+            </a:gs>
+            <a:gs pos="80000">
+              <a:schemeClr val="phClr">
+                <a:shade val="93000"/>
+                <a:satMod val="130000"/>
+              </a:schemeClr>
+            </a:gs>
+            <a:gs pos="100000">
+              <a:schemeClr val="phClr">
+                <a:shade val="94000"/>
+                <a:satMod val="135000"/>
+              </a:schemeClr>
+            </a:gs>
+          </a:gsLst>
+          <a:lin ang="16200000" scaled="0"/>
+        </a:gradFill>
+      </a:fillStyleLst>
+      <a:lnStyleLst>
+        <a:ln w="9525" cap="flat" cmpd="sng" algn="ctr">
+          <a:solidFill>
+            <a:schemeClr val="phClr">
+              <a:shade val="95000"/>
+              <a:satMod val="105000"/>
+            </a:schemeClr>
+          </a:solidFill>
+          <a:prstDash val="solid"/>
+        </a:ln>
+        <a:ln w="25400" cap="flat" cmpd="sng" algn="ctr">
+          <a:solidFill>
+            <a:schemeClr val="phClr"/>
+          </a:solidFill>
+          <a:prstDash val="solid"/>
+        </a:ln>
+        <a:ln w="38100" cap="flat" cmpd="sng" algn="ctr">
+          <a:solidFill>
+            <a:schemeClr val="phClr"/>
+          </a:solidFill>
+          <a:prstDash val="solid"/>
+        </a:ln>
+      </a:lnStyleLst>
+      <a:effectStyleLst>
+        <a:effectStyle>
+          <a:effectLst>
+            <a:outerShdw blurRad="40000" dist="20000" dir="5400000" rotWithShape="0">
+              <a:srgbClr val="000000">
+                <a:alpha val="38000"/>
+              </a:srgbClr>
+            </a:outerShdw>
+          </a:effectLst>
+        </a:effectStyle>
+        <a:effectStyle>
+          <a:effectLst>
+            <a:outerShdw blurRad="40000" dist="23000" dir="5400000" rotWithShape="0">
+              <a:srgbClr val="000000">
+                <a:alpha val="35000"/>
+              </a:srgbClr>
+            </a:outerShdw>
+          </a:effectLst>
+        </a:effectStyle>
+        <a:effectStyle>
+          <a:effectLst>
+            <a:outerShdw blurRad="40000" dist="23000" dir="5400000" rotWithShape="0">
+              <a:srgbClr val="000000">
+                <a:alpha val="35000"/>
+              </a:srgbClr>
+            </a:outerShdw>
+          </a:effectLst>
+          <a:scene3d>
+            <a:camera prst="orthographicFront">
+              <a:rot lat="0" lon="0" rev="0"/>
+            </a:camera>
+            <a:lightRig rig="threePt" dir="t">
+              <a:rot lat="0" lon="0" rev="1200000"/>
+            </a:lightRig>
+          </a:scene3d>
+          <a:sp3d>
+            <a:bevelT w="63500" h="25400"/>
+          </a:sp3d>
+        </a:effectStyle>
+      </a:effectStyleLst>
+      <a:bgFillStyleLst>
+        <a:solidFill>
+          <a:schemeClr val="phClr"/>
+        </a:solidFill>
+        <a:gradFill rotWithShape="1">
+          <a:gsLst>
+            <a:gs pos="0">
+              <a:schemeClr val="phClr">
+                <a:tint val="40000"/>
+                <a:satMod val="350000"/>
+              </a:schemeClr>
+            </a:gs>
+            <a:gs pos="40000">
+              <a:schemeClr val="phClr">
+                <a:tint val="45000"/>
+                <a:shade val="99000"/>
+                <a:satMod val="350000"/>
+              </a:schemeClr>
+            </a:gs>
+            <a:gs pos="100000">
+              <a:schemeClr val="phClr">
+                <a:shade val="20000"/>
+                <a:satMod val="255000"/>
+              </a:schemeClr>
+            </a:gs>
+          </a:gsLst>
+          <a:path path="circle">
+            <a:fillToRect l="50000" t="-80000" r="50000" b="180000"/>
+          </a:path>
+        </a:gradFill>
+        <a:gradFill rotWithShape="1">
+          <a:gsLst>
+            <a:gs pos="0">
+              <a:schemeClr val="phClr">
+                <a:tint val="80000"/>
+                <a:satMod val="300000"/>
+              </a:schemeClr>
+            </a:gs>
+            <a:gs pos="100000">
+              <a:schemeClr val="phClr">
+                <a:shade val="30000"/>
+                <a:satMod val="200000"/>
+              </a:schemeClr>
+            </a:gs>
+          </a:gsLst>
+          <a:path path="circle">
+            <a:fillToRect l="50000" t="50000" r="50000" b="50000"/>
+          </a:path>
+        </a:gradFill>
+      </a:bgFillStyleLst>
+    </a:fmtScheme>
+  </a:themeElements>
+</a:theme>
 </file>
</xml_diff>